<commit_message>
Modified file via upload
</commit_message>
<xml_diff>
--- a/Presentations/Black-Box attack against RNN based Malware Detection Algorithms.pptx
+++ b/Presentations/Black-Box attack against RNN based Malware Detection Algorithms.pptx
@@ -10,13 +10,13 @@
   <p:sldIdLst>
     <p:sldId id="256" r:id="rId2"/>
     <p:sldId id="257" r:id="rId3"/>
-    <p:sldId id="260" r:id="rId4"/>
-    <p:sldId id="262" r:id="rId5"/>
-    <p:sldId id="264" r:id="rId6"/>
-    <p:sldId id="265" r:id="rId7"/>
-    <p:sldId id="263" r:id="rId8"/>
-    <p:sldId id="266" r:id="rId9"/>
-    <p:sldId id="267" r:id="rId10"/>
+    <p:sldId id="263" r:id="rId4"/>
+    <p:sldId id="264" r:id="rId5"/>
+    <p:sldId id="265" r:id="rId6"/>
+    <p:sldId id="266" r:id="rId7"/>
+    <p:sldId id="267" r:id="rId8"/>
+    <p:sldId id="260" r:id="rId9"/>
+    <p:sldId id="262" r:id="rId10"/>
     <p:sldId id="258" r:id="rId11"/>
     <p:sldId id="259" r:id="rId12"/>
   </p:sldIdLst>
@@ -117,6 +117,11 @@
       </a:defRPr>
     </a:lvl9pPr>
   </p:defaultTextStyle>
+  <p:extLst>
+    <p:ext uri="{EFAFB233-063F-42B5-8137-9DF3F51BA10A}">
+      <p15:sldGuideLst xmlns:p15="http://schemas.microsoft.com/office/powerpoint/2012/main"/>
+    </p:ext>
+  </p:extLst>
 </p:presentation>
 </file>
 
@@ -6712,1532 +6717,6 @@
           <p:cNvPr id="2" name="Title 1">
             <a:extLst>
               <a:ext uri="{FF2B5EF4-FFF2-40B4-BE49-F238E27FC236}">
-                <a16:creationId xmlns:a16="http://schemas.microsoft.com/office/drawing/2014/main" id="{79EBC8E0-548A-414F-AAB9-51C713C34F27}"/>
-              </a:ext>
-            </a:extLst>
-          </p:cNvPr>
-          <p:cNvSpPr>
-            <a:spLocks noGrp="1"/>
-          </p:cNvSpPr>
-          <p:nvPr>
-            <p:ph type="title"/>
-          </p:nvPr>
-        </p:nvSpPr>
-        <p:spPr/>
-        <p:txBody>
-          <a:bodyPr/>
-          <a:lstStyle/>
-          <a:p>
-            <a:r>
-              <a:rPr lang="en-IN" dirty="0"/>
-              <a:t>Main Attack Idea</a:t>
-            </a:r>
-          </a:p>
-        </p:txBody>
-      </p:sp>
-      <p:sp>
-        <p:nvSpPr>
-          <p:cNvPr id="3" name="Content Placeholder 2">
-            <a:extLst>
-              <a:ext uri="{FF2B5EF4-FFF2-40B4-BE49-F238E27FC236}">
-                <a16:creationId xmlns:a16="http://schemas.microsoft.com/office/drawing/2014/main" id="{BF05E424-3502-419D-A664-F3A24FDB87BC}"/>
-              </a:ext>
-            </a:extLst>
-          </p:cNvPr>
-          <p:cNvSpPr>
-            <a:spLocks noGrp="1"/>
-          </p:cNvSpPr>
-          <p:nvPr>
-            <p:ph idx="1"/>
-          </p:nvPr>
-        </p:nvSpPr>
-        <p:spPr/>
-        <p:txBody>
-          <a:bodyPr>
-            <a:normAutofit/>
-          </a:bodyPr>
-          <a:lstStyle/>
-          <a:p>
-            <a:pPr algn="just"/>
-            <a:r>
-              <a:rPr lang="en-IN" dirty="0"/>
-              <a:t>Challenge</a:t>
-            </a:r>
-          </a:p>
-          <a:p>
-            <a:pPr lvl="1" algn="just"/>
-            <a:r>
-              <a:rPr lang="en-GB" dirty="0"/>
-              <a:t>Existing researches on adversarial samples mainly focus on images, which are represented as matrices with fixed dimensions, and the values of the matrices are continuous.</a:t>
-            </a:r>
-          </a:p>
-          <a:p>
-            <a:pPr lvl="1" algn="just"/>
-            <a:r>
-              <a:rPr lang="en-GB" dirty="0"/>
-              <a:t>API sequences consist of discrete symbols with variable lengths. Hence, generating adversarial examples for API sequences will become quite different from images.</a:t>
-            </a:r>
-          </a:p>
-          <a:p>
-            <a:pPr lvl="1" algn="just"/>
-            <a:r>
-              <a:rPr lang="en-GB" dirty="0"/>
-              <a:t>Adversarial examples are generated from API sequences by inserting some irreverent APIs into the original sequences. Removing an API from the API sequence may make the program unable to work. How to insert irreverent APIs into the sequence is the key to generate adversarial examples.</a:t>
-            </a:r>
-            <a:endParaRPr lang="en-IN" dirty="0"/>
-          </a:p>
-        </p:txBody>
-      </p:sp>
-      <p:pic>
-        <p:nvPicPr>
-          <p:cNvPr id="1026" name="Picture 2" descr="Image result for image and corresponding matrix">
-            <a:extLst>
-              <a:ext uri="{FF2B5EF4-FFF2-40B4-BE49-F238E27FC236}">
-                <a16:creationId xmlns:a16="http://schemas.microsoft.com/office/drawing/2014/main" id="{0A073AF4-441A-4F2C-9857-CB15D49D8721}"/>
-              </a:ext>
-            </a:extLst>
-          </p:cNvPr>
-          <p:cNvPicPr>
-            <a:picLocks noChangeAspect="1" noChangeArrowheads="1"/>
-          </p:cNvPicPr>
-          <p:nvPr/>
-        </p:nvPicPr>
-        <p:blipFill>
-          <a:blip r:embed="rId2">
-            <a:extLst>
-              <a:ext uri="{28A0092B-C50C-407E-A947-70E740481C1C}">
-                <a14:useLocalDpi xmlns:a14="http://schemas.microsoft.com/office/drawing/2010/main" val="0"/>
-              </a:ext>
-            </a:extLst>
-          </a:blip>
-          <a:srcRect/>
-          <a:stretch>
-            <a:fillRect/>
-          </a:stretch>
-        </p:blipFill>
-        <p:spPr bwMode="auto">
-          <a:xfrm>
-            <a:off x="1069848" y="4991100"/>
-            <a:ext cx="3949827" cy="1627059"/>
-          </a:xfrm>
-          <a:prstGeom prst="rect">
-            <a:avLst/>
-          </a:prstGeom>
-          <a:noFill/>
-          <a:extLst>
-            <a:ext uri="{909E8E84-426E-40DD-AFC4-6F175D3DCCD1}">
-              <a14:hiddenFill xmlns:a14="http://schemas.microsoft.com/office/drawing/2010/main">
-                <a:solidFill>
-                  <a:srgbClr val="FFFFFF"/>
-                </a:solidFill>
-              </a14:hiddenFill>
-            </a:ext>
-          </a:extLst>
-        </p:spPr>
-      </p:pic>
-      <p:graphicFrame>
-        <p:nvGraphicFramePr>
-          <p:cNvPr id="7" name="Table 6">
-            <a:extLst>
-              <a:ext uri="{FF2B5EF4-FFF2-40B4-BE49-F238E27FC236}">
-                <a16:creationId xmlns:a16="http://schemas.microsoft.com/office/drawing/2014/main" id="{763FB12E-4CFE-476D-BC09-D5ABD594291B}"/>
-              </a:ext>
-            </a:extLst>
-          </p:cNvPr>
-          <p:cNvGraphicFramePr>
-            <a:graphicFrameLocks noGrp="1"/>
-          </p:cNvGraphicFramePr>
-          <p:nvPr>
-            <p:extLst>
-              <p:ext uri="{D42A27DB-BD31-4B8C-83A1-F6EECF244321}">
-                <p14:modId xmlns:p14="http://schemas.microsoft.com/office/powerpoint/2010/main" val="3200830709"/>
-              </p:ext>
-            </p:extLst>
-          </p:nvPr>
-        </p:nvGraphicFramePr>
-        <p:xfrm>
-          <a:off x="6584823" y="5248369"/>
-          <a:ext cx="3790778" cy="1112520"/>
-        </p:xfrm>
-        <a:graphic>
-          <a:graphicData uri="http://schemas.openxmlformats.org/drawingml/2006/table">
-            <a:tbl>
-              <a:tblPr firstRow="1" bandRow="1">
-                <a:tableStyleId>{5C22544A-7EE6-4342-B048-85BDC9FD1C3A}</a:tableStyleId>
-              </a:tblPr>
-              <a:tblGrid>
-                <a:gridCol w="887730">
-                  <a:extLst>
-                    <a:ext uri="{9D8B030D-6E8A-4147-A177-3AD203B41FA5}">
-                      <a16:colId xmlns:a16="http://schemas.microsoft.com/office/drawing/2014/main" val="4191620136"/>
-                    </a:ext>
-                  </a:extLst>
-                </a:gridCol>
-                <a:gridCol w="2903048">
-                  <a:extLst>
-                    <a:ext uri="{9D8B030D-6E8A-4147-A177-3AD203B41FA5}">
-                      <a16:colId xmlns:a16="http://schemas.microsoft.com/office/drawing/2014/main" val="619418440"/>
-                    </a:ext>
-                  </a:extLst>
-                </a:gridCol>
-              </a:tblGrid>
-              <a:tr h="370840">
-                <a:tc>
-                  <a:txBody>
-                    <a:bodyPr/>
-                    <a:lstStyle/>
-                    <a:p>
-                      <a:pPr algn="ctr"/>
-                      <a:endParaRPr lang="en-IN" sz="1100" dirty="0"/>
-                    </a:p>
-                  </a:txBody>
-                  <a:tcPr anchor="ctr"/>
-                </a:tc>
-                <a:tc>
-                  <a:txBody>
-                    <a:bodyPr/>
-                    <a:lstStyle/>
-                    <a:p>
-                      <a:pPr algn="ctr"/>
-                      <a:r>
-                        <a:rPr lang="en-IN" sz="1100" dirty="0"/>
-                        <a:t>Sequence of APIs</a:t>
-                      </a:r>
-                    </a:p>
-                  </a:txBody>
-                  <a:tcPr anchor="ctr"/>
-                </a:tc>
-                <a:extLst>
-                  <a:ext uri="{0D108BD9-81ED-4DB2-BD59-A6C34878D82A}">
-                    <a16:rowId xmlns:a16="http://schemas.microsoft.com/office/drawing/2014/main" val="2958628287"/>
-                  </a:ext>
-                </a:extLst>
-              </a:tr>
-              <a:tr h="370840">
-                <a:tc>
-                  <a:txBody>
-                    <a:bodyPr/>
-                    <a:lstStyle/>
-                    <a:p>
-                      <a:pPr algn="ctr"/>
-                      <a:r>
-                        <a:rPr lang="en-IN" sz="1100" dirty="0"/>
-                        <a:t>Program 1</a:t>
-                      </a:r>
-                    </a:p>
-                  </a:txBody>
-                  <a:tcPr anchor="ctr"/>
-                </a:tc>
-                <a:tc>
-                  <a:txBody>
-                    <a:bodyPr/>
-                    <a:lstStyle/>
-                    <a:p>
-                      <a:pPr algn="ctr"/>
-                      <a:r>
-                        <a:rPr lang="en-IN" sz="1100" dirty="0"/>
-                        <a:t>(API_1, API_3, API_7, API_2)</a:t>
-                      </a:r>
-                    </a:p>
-                  </a:txBody>
-                  <a:tcPr anchor="ctr"/>
-                </a:tc>
-                <a:extLst>
-                  <a:ext uri="{0D108BD9-81ED-4DB2-BD59-A6C34878D82A}">
-                    <a16:rowId xmlns:a16="http://schemas.microsoft.com/office/drawing/2014/main" val="3925131710"/>
-                  </a:ext>
-                </a:extLst>
-              </a:tr>
-              <a:tr h="370840">
-                <a:tc>
-                  <a:txBody>
-                    <a:bodyPr/>
-                    <a:lstStyle/>
-                    <a:p>
-                      <a:pPr algn="ctr"/>
-                      <a:r>
-                        <a:rPr lang="en-IN" sz="1100" dirty="0"/>
-                        <a:t>Program 2</a:t>
-                      </a:r>
-                    </a:p>
-                  </a:txBody>
-                  <a:tcPr anchor="ctr"/>
-                </a:tc>
-                <a:tc>
-                  <a:txBody>
-                    <a:bodyPr/>
-                    <a:lstStyle/>
-                    <a:p>
-                      <a:pPr algn="ctr"/>
-                      <a:r>
-                        <a:rPr lang="en-IN" sz="1100" dirty="0"/>
-                        <a:t>(API_4, API_1, API_3, API_8, API_1, API_2)</a:t>
-                      </a:r>
-                    </a:p>
-                  </a:txBody>
-                  <a:tcPr anchor="ctr"/>
-                </a:tc>
-                <a:extLst>
-                  <a:ext uri="{0D108BD9-81ED-4DB2-BD59-A6C34878D82A}">
-                    <a16:rowId xmlns:a16="http://schemas.microsoft.com/office/drawing/2014/main" val="2623468376"/>
-                  </a:ext>
-                </a:extLst>
-              </a:tr>
-            </a:tbl>
-          </a:graphicData>
-        </a:graphic>
-      </p:graphicFrame>
-      <p:graphicFrame>
-        <p:nvGraphicFramePr>
-          <p:cNvPr id="9" name="Table 8">
-            <a:extLst>
-              <a:ext uri="{FF2B5EF4-FFF2-40B4-BE49-F238E27FC236}">
-                <a16:creationId xmlns:a16="http://schemas.microsoft.com/office/drawing/2014/main" id="{EEB89FBD-99B6-45CB-831E-790E182AC115}"/>
-              </a:ext>
-            </a:extLst>
-          </p:cNvPr>
-          <p:cNvGraphicFramePr>
-            <a:graphicFrameLocks noGrp="1"/>
-          </p:cNvGraphicFramePr>
-          <p:nvPr>
-            <p:extLst>
-              <p:ext uri="{D42A27DB-BD31-4B8C-83A1-F6EECF244321}">
-                <p14:modId xmlns:p14="http://schemas.microsoft.com/office/powerpoint/2010/main" val="3982964840"/>
-              </p:ext>
-            </p:extLst>
-          </p:nvPr>
-        </p:nvGraphicFramePr>
-        <p:xfrm>
-          <a:off x="4334615" y="5062949"/>
-          <a:ext cx="4145597" cy="1483360"/>
-        </p:xfrm>
-        <a:graphic>
-          <a:graphicData uri="http://schemas.openxmlformats.org/drawingml/2006/table">
-            <a:tbl>
-              <a:tblPr firstRow="1" bandRow="1">
-                <a:tableStyleId>{5C22544A-7EE6-4342-B048-85BDC9FD1C3A}</a:tableStyleId>
-              </a:tblPr>
-              <a:tblGrid>
-                <a:gridCol w="1679892">
-                  <a:extLst>
-                    <a:ext uri="{9D8B030D-6E8A-4147-A177-3AD203B41FA5}">
-                      <a16:colId xmlns:a16="http://schemas.microsoft.com/office/drawing/2014/main" val="3459903278"/>
-                    </a:ext>
-                  </a:extLst>
-                </a:gridCol>
-                <a:gridCol w="2465705">
-                  <a:extLst>
-                    <a:ext uri="{9D8B030D-6E8A-4147-A177-3AD203B41FA5}">
-                      <a16:colId xmlns:a16="http://schemas.microsoft.com/office/drawing/2014/main" val="155859054"/>
-                    </a:ext>
-                  </a:extLst>
-                </a:gridCol>
-              </a:tblGrid>
-              <a:tr h="370840">
-                <a:tc>
-                  <a:txBody>
-                    <a:bodyPr/>
-                    <a:lstStyle/>
-                    <a:p>
-                      <a:pPr algn="ctr"/>
-                      <a:endParaRPr lang="en-IN" sz="1100" dirty="0"/>
-                    </a:p>
-                  </a:txBody>
-                  <a:tcPr anchor="ctr"/>
-                </a:tc>
-                <a:tc>
-                  <a:txBody>
-                    <a:bodyPr/>
-                    <a:lstStyle/>
-                    <a:p>
-                      <a:pPr algn="ctr"/>
-                      <a:r>
-                        <a:rPr lang="en-IN" sz="1100" dirty="0"/>
-                        <a:t>API Sequence</a:t>
-                      </a:r>
-                    </a:p>
-                  </a:txBody>
-                  <a:tcPr anchor="ctr"/>
-                </a:tc>
-                <a:extLst>
-                  <a:ext uri="{0D108BD9-81ED-4DB2-BD59-A6C34878D82A}">
-                    <a16:rowId xmlns:a16="http://schemas.microsoft.com/office/drawing/2014/main" val="757139603"/>
-                  </a:ext>
-                </a:extLst>
-              </a:tr>
-              <a:tr h="370840">
-                <a:tc>
-                  <a:txBody>
-                    <a:bodyPr/>
-                    <a:lstStyle/>
-                    <a:p>
-                      <a:pPr algn="ctr"/>
-                      <a:r>
-                        <a:rPr lang="en-IN" sz="1100" dirty="0"/>
-                        <a:t>Original API Sequence</a:t>
-                      </a:r>
-                    </a:p>
-                  </a:txBody>
-                  <a:tcPr anchor="ctr"/>
-                </a:tc>
-                <a:tc>
-                  <a:txBody>
-                    <a:bodyPr/>
-                    <a:lstStyle/>
-                    <a:p>
-                      <a:pPr algn="ctr"/>
-                      <a:r>
-                        <a:rPr lang="en-IN" sz="1100" dirty="0"/>
-                        <a:t>(API_1, API_3, API_7, API_2)</a:t>
-                      </a:r>
-                    </a:p>
-                  </a:txBody>
-                  <a:tcPr anchor="ctr"/>
-                </a:tc>
-                <a:extLst>
-                  <a:ext uri="{0D108BD9-81ED-4DB2-BD59-A6C34878D82A}">
-                    <a16:rowId xmlns:a16="http://schemas.microsoft.com/office/drawing/2014/main" val="2279994703"/>
-                  </a:ext>
-                </a:extLst>
-              </a:tr>
-              <a:tr h="370840">
-                <a:tc>
-                  <a:txBody>
-                    <a:bodyPr/>
-                    <a:lstStyle/>
-                    <a:p>
-                      <a:pPr algn="ctr"/>
-                      <a:r>
-                        <a:rPr lang="en-IN" sz="1100" dirty="0"/>
-                        <a:t>Correctly Perturbated </a:t>
-                      </a:r>
-                    </a:p>
-                  </a:txBody>
-                  <a:tcPr anchor="ctr"/>
-                </a:tc>
-                <a:tc>
-                  <a:txBody>
-                    <a:bodyPr/>
-                    <a:lstStyle/>
-                    <a:p>
-                      <a:pPr marL="0" marR="0" lvl="0" indent="0" algn="ctr" defTabSz="914400" rtl="0" eaLnBrk="1" fontAlgn="auto" latinLnBrk="0" hangingPunct="1">
-                        <a:lnSpc>
-                          <a:spcPct val="100000"/>
-                        </a:lnSpc>
-                        <a:spcBef>
-                          <a:spcPts val="0"/>
-                        </a:spcBef>
-                        <a:spcAft>
-                          <a:spcPts val="0"/>
-                        </a:spcAft>
-                        <a:buClrTx/>
-                        <a:buSzTx/>
-                        <a:buFontTx/>
-                        <a:buNone/>
-                        <a:tabLst/>
-                        <a:defRPr/>
-                      </a:pPr>
-                      <a:r>
-                        <a:rPr lang="en-IN" sz="1100" dirty="0"/>
-                        <a:t>(API_1, API_3, API_7, API_2,</a:t>
-                      </a:r>
-                      <a:r>
-                        <a:rPr lang="en-IN" sz="1100" b="1" dirty="0">
-                          <a:solidFill>
-                            <a:srgbClr val="FF0000"/>
-                          </a:solidFill>
-                        </a:rPr>
-                        <a:t> API_8</a:t>
-                      </a:r>
-                      <a:r>
-                        <a:rPr lang="en-IN" sz="1100" dirty="0"/>
-                        <a:t>)</a:t>
-                      </a:r>
-                    </a:p>
-                  </a:txBody>
-                  <a:tcPr anchor="ctr"/>
-                </a:tc>
-                <a:extLst>
-                  <a:ext uri="{0D108BD9-81ED-4DB2-BD59-A6C34878D82A}">
-                    <a16:rowId xmlns:a16="http://schemas.microsoft.com/office/drawing/2014/main" val="362804822"/>
-                  </a:ext>
-                </a:extLst>
-              </a:tr>
-              <a:tr h="370840">
-                <a:tc>
-                  <a:txBody>
-                    <a:bodyPr/>
-                    <a:lstStyle/>
-                    <a:p>
-                      <a:pPr algn="ctr"/>
-                      <a:r>
-                        <a:rPr lang="en-IN" sz="1100" dirty="0"/>
-                        <a:t>Wrongly Perturbated</a:t>
-                      </a:r>
-                    </a:p>
-                  </a:txBody>
-                  <a:tcPr anchor="ctr"/>
-                </a:tc>
-                <a:tc>
-                  <a:txBody>
-                    <a:bodyPr/>
-                    <a:lstStyle/>
-                    <a:p>
-                      <a:pPr marL="0" marR="0" lvl="0" indent="0" algn="ctr" defTabSz="914400" rtl="0" eaLnBrk="1" fontAlgn="auto" latinLnBrk="0" hangingPunct="1">
-                        <a:lnSpc>
-                          <a:spcPct val="100000"/>
-                        </a:lnSpc>
-                        <a:spcBef>
-                          <a:spcPts val="0"/>
-                        </a:spcBef>
-                        <a:spcAft>
-                          <a:spcPts val="0"/>
-                        </a:spcAft>
-                        <a:buClrTx/>
-                        <a:buSzTx/>
-                        <a:buFontTx/>
-                        <a:buNone/>
-                        <a:tabLst/>
-                        <a:defRPr/>
-                      </a:pPr>
-                      <a:r>
-                        <a:rPr lang="en-IN" sz="1100" dirty="0"/>
-                        <a:t>(API_1, API_3, API_7)</a:t>
-                      </a:r>
-                    </a:p>
-                  </a:txBody>
-                  <a:tcPr anchor="ctr"/>
-                </a:tc>
-                <a:extLst>
-                  <a:ext uri="{0D108BD9-81ED-4DB2-BD59-A6C34878D82A}">
-                    <a16:rowId xmlns:a16="http://schemas.microsoft.com/office/drawing/2014/main" val="644314247"/>
-                  </a:ext>
-                </a:extLst>
-              </a:tr>
-            </a:tbl>
-          </a:graphicData>
-        </a:graphic>
-      </p:graphicFrame>
-      <p:sp>
-        <p:nvSpPr>
-          <p:cNvPr id="10" name="Slide Number Placeholder 9">
-            <a:extLst>
-              <a:ext uri="{FF2B5EF4-FFF2-40B4-BE49-F238E27FC236}">
-                <a16:creationId xmlns:a16="http://schemas.microsoft.com/office/drawing/2014/main" id="{4460E370-4461-4AC4-9F1D-12287D09CFA4}"/>
-              </a:ext>
-            </a:extLst>
-          </p:cNvPr>
-          <p:cNvSpPr>
-            <a:spLocks noGrp="1"/>
-          </p:cNvSpPr>
-          <p:nvPr>
-            <p:ph type="sldNum" sz="quarter" idx="12"/>
-          </p:nvPr>
-        </p:nvSpPr>
-        <p:spPr/>
-        <p:txBody>
-          <a:bodyPr/>
-          <a:lstStyle/>
-          <a:p>
-            <a:fld id="{82BC92B1-C9EA-4D86-A246-22CEB90EE2A6}" type="slidenum">
-              <a:rPr lang="en-IN" smtClean="0"/>
-              <a:t>3</a:t>
-            </a:fld>
-            <a:endParaRPr lang="en-IN"/>
-          </a:p>
-        </p:txBody>
-      </p:sp>
-      <p:sp>
-        <p:nvSpPr>
-          <p:cNvPr id="11" name="Date Placeholder 10">
-            <a:extLst>
-              <a:ext uri="{FF2B5EF4-FFF2-40B4-BE49-F238E27FC236}">
-                <a16:creationId xmlns:a16="http://schemas.microsoft.com/office/drawing/2014/main" id="{0D281BFE-389E-4C55-8451-A03C315D1217}"/>
-              </a:ext>
-            </a:extLst>
-          </p:cNvPr>
-          <p:cNvSpPr>
-            <a:spLocks noGrp="1"/>
-          </p:cNvSpPr>
-          <p:nvPr>
-            <p:ph type="dt" sz="half" idx="10"/>
-          </p:nvPr>
-        </p:nvSpPr>
-        <p:spPr/>
-        <p:txBody>
-          <a:bodyPr/>
-          <a:lstStyle/>
-          <a:p>
-            <a:fld id="{7D04CE3A-7216-43D3-905D-8555A835A83C}" type="datetime1">
-              <a:rPr lang="en-IN" smtClean="0"/>
-              <a:t>11-10-2017</a:t>
-            </a:fld>
-            <a:endParaRPr lang="en-IN"/>
-          </a:p>
-        </p:txBody>
-      </p:sp>
-    </p:spTree>
-    <p:extLst>
-      <p:ext uri="{BB962C8B-B14F-4D97-AF65-F5344CB8AC3E}">
-        <p14:creationId xmlns:p14="http://schemas.microsoft.com/office/powerpoint/2010/main" val="2394152644"/>
-      </p:ext>
-    </p:extLst>
-  </p:cSld>
-  <p:clrMapOvr>
-    <a:masterClrMapping/>
-  </p:clrMapOvr>
-  <p:timing>
-    <p:tnLst>
-      <p:par>
-        <p:cTn id="1" dur="indefinite" restart="never" nodeType="tmRoot">
-          <p:childTnLst>
-            <p:seq concurrent="1" nextAc="seek">
-              <p:cTn id="2" dur="indefinite" nodeType="mainSeq">
-                <p:childTnLst>
-                  <p:par>
-                    <p:cTn id="3" fill="hold">
-                      <p:stCondLst>
-                        <p:cond delay="indefinite"/>
-                      </p:stCondLst>
-                      <p:childTnLst>
-                        <p:par>
-                          <p:cTn id="4" fill="hold">
-                            <p:stCondLst>
-                              <p:cond delay="0"/>
-                            </p:stCondLst>
-                            <p:childTnLst>
-                              <p:par>
-                                <p:cTn id="5" presetID="1" presetClass="entr" presetSubtype="0" fill="hold" grpId="0" nodeType="clickEffect">
-                                  <p:stCondLst>
-                                    <p:cond delay="0"/>
-                                  </p:stCondLst>
-                                  <p:childTnLst>
-                                    <p:set>
-                                      <p:cBhvr>
-                                        <p:cTn id="6" dur="1" fill="hold">
-                                          <p:stCondLst>
-                                            <p:cond delay="0"/>
-                                          </p:stCondLst>
-                                        </p:cTn>
-                                        <p:tgtEl>
-                                          <p:spTgt spid="3">
-                                            <p:txEl>
-                                              <p:pRg st="0" end="0"/>
-                                            </p:txEl>
-                                          </p:spTgt>
-                                        </p:tgtEl>
-                                        <p:attrNameLst>
-                                          <p:attrName>style.visibility</p:attrName>
-                                        </p:attrNameLst>
-                                      </p:cBhvr>
-                                      <p:to>
-                                        <p:strVal val="visible"/>
-                                      </p:to>
-                                    </p:set>
-                                  </p:childTnLst>
-                                </p:cTn>
-                              </p:par>
-                              <p:par>
-                                <p:cTn id="7" presetID="1" presetClass="entr" presetSubtype="0" fill="hold" grpId="0" nodeType="withEffect">
-                                  <p:stCondLst>
-                                    <p:cond delay="0"/>
-                                  </p:stCondLst>
-                                  <p:childTnLst>
-                                    <p:set>
-                                      <p:cBhvr>
-                                        <p:cTn id="8" dur="1" fill="hold">
-                                          <p:stCondLst>
-                                            <p:cond delay="0"/>
-                                          </p:stCondLst>
-                                        </p:cTn>
-                                        <p:tgtEl>
-                                          <p:spTgt spid="3">
-                                            <p:txEl>
-                                              <p:pRg st="1" end="1"/>
-                                            </p:txEl>
-                                          </p:spTgt>
-                                        </p:tgtEl>
-                                        <p:attrNameLst>
-                                          <p:attrName>style.visibility</p:attrName>
-                                        </p:attrNameLst>
-                                      </p:cBhvr>
-                                      <p:to>
-                                        <p:strVal val="visible"/>
-                                      </p:to>
-                                    </p:set>
-                                  </p:childTnLst>
-                                </p:cTn>
-                              </p:par>
-                            </p:childTnLst>
-                          </p:cTn>
-                        </p:par>
-                      </p:childTnLst>
-                    </p:cTn>
-                  </p:par>
-                  <p:par>
-                    <p:cTn id="9" fill="hold">
-                      <p:stCondLst>
-                        <p:cond delay="indefinite"/>
-                      </p:stCondLst>
-                      <p:childTnLst>
-                        <p:par>
-                          <p:cTn id="10" fill="hold">
-                            <p:stCondLst>
-                              <p:cond delay="0"/>
-                            </p:stCondLst>
-                            <p:childTnLst>
-                              <p:par>
-                                <p:cTn id="11" presetID="2" presetClass="entr" presetSubtype="4" fill="hold" nodeType="clickEffect">
-                                  <p:stCondLst>
-                                    <p:cond delay="0"/>
-                                  </p:stCondLst>
-                                  <p:childTnLst>
-                                    <p:set>
-                                      <p:cBhvr>
-                                        <p:cTn id="12" dur="1" fill="hold">
-                                          <p:stCondLst>
-                                            <p:cond delay="0"/>
-                                          </p:stCondLst>
-                                        </p:cTn>
-                                        <p:tgtEl>
-                                          <p:spTgt spid="1026"/>
-                                        </p:tgtEl>
-                                        <p:attrNameLst>
-                                          <p:attrName>style.visibility</p:attrName>
-                                        </p:attrNameLst>
-                                      </p:cBhvr>
-                                      <p:to>
-                                        <p:strVal val="visible"/>
-                                      </p:to>
-                                    </p:set>
-                                    <p:anim calcmode="lin" valueType="num">
-                                      <p:cBhvr additive="base">
-                                        <p:cTn id="13" dur="250" fill="hold"/>
-                                        <p:tgtEl>
-                                          <p:spTgt spid="1026"/>
-                                        </p:tgtEl>
-                                        <p:attrNameLst>
-                                          <p:attrName>ppt_x</p:attrName>
-                                        </p:attrNameLst>
-                                      </p:cBhvr>
-                                      <p:tavLst>
-                                        <p:tav tm="0">
-                                          <p:val>
-                                            <p:strVal val="#ppt_x"/>
-                                          </p:val>
-                                        </p:tav>
-                                        <p:tav tm="100000">
-                                          <p:val>
-                                            <p:strVal val="#ppt_x"/>
-                                          </p:val>
-                                        </p:tav>
-                                      </p:tavLst>
-                                    </p:anim>
-                                    <p:anim calcmode="lin" valueType="num">
-                                      <p:cBhvr additive="base">
-                                        <p:cTn id="14" dur="250" fill="hold"/>
-                                        <p:tgtEl>
-                                          <p:spTgt spid="1026"/>
-                                        </p:tgtEl>
-                                        <p:attrNameLst>
-                                          <p:attrName>ppt_y</p:attrName>
-                                        </p:attrNameLst>
-                                      </p:cBhvr>
-                                      <p:tavLst>
-                                        <p:tav tm="0">
-                                          <p:val>
-                                            <p:strVal val="1+#ppt_h/2"/>
-                                          </p:val>
-                                        </p:tav>
-                                        <p:tav tm="100000">
-                                          <p:val>
-                                            <p:strVal val="#ppt_y"/>
-                                          </p:val>
-                                        </p:tav>
-                                      </p:tavLst>
-                                    </p:anim>
-                                  </p:childTnLst>
-                                </p:cTn>
-                              </p:par>
-                            </p:childTnLst>
-                          </p:cTn>
-                        </p:par>
-                      </p:childTnLst>
-                    </p:cTn>
-                  </p:par>
-                  <p:par>
-                    <p:cTn id="15" fill="hold">
-                      <p:stCondLst>
-                        <p:cond delay="indefinite"/>
-                      </p:stCondLst>
-                      <p:childTnLst>
-                        <p:par>
-                          <p:cTn id="16" fill="hold">
-                            <p:stCondLst>
-                              <p:cond delay="0"/>
-                            </p:stCondLst>
-                            <p:childTnLst>
-                              <p:par>
-                                <p:cTn id="17" presetID="1" presetClass="entr" presetSubtype="0" fill="hold" grpId="0" nodeType="clickEffect">
-                                  <p:stCondLst>
-                                    <p:cond delay="0"/>
-                                  </p:stCondLst>
-                                  <p:childTnLst>
-                                    <p:set>
-                                      <p:cBhvr>
-                                        <p:cTn id="18" dur="1" fill="hold">
-                                          <p:stCondLst>
-                                            <p:cond delay="0"/>
-                                          </p:stCondLst>
-                                        </p:cTn>
-                                        <p:tgtEl>
-                                          <p:spTgt spid="3">
-                                            <p:txEl>
-                                              <p:pRg st="2" end="2"/>
-                                            </p:txEl>
-                                          </p:spTgt>
-                                        </p:tgtEl>
-                                        <p:attrNameLst>
-                                          <p:attrName>style.visibility</p:attrName>
-                                        </p:attrNameLst>
-                                      </p:cBhvr>
-                                      <p:to>
-                                        <p:strVal val="visible"/>
-                                      </p:to>
-                                    </p:set>
-                                  </p:childTnLst>
-                                </p:cTn>
-                              </p:par>
-                            </p:childTnLst>
-                          </p:cTn>
-                        </p:par>
-                      </p:childTnLst>
-                    </p:cTn>
-                  </p:par>
-                  <p:par>
-                    <p:cTn id="19" fill="hold">
-                      <p:stCondLst>
-                        <p:cond delay="indefinite"/>
-                      </p:stCondLst>
-                      <p:childTnLst>
-                        <p:par>
-                          <p:cTn id="20" fill="hold">
-                            <p:stCondLst>
-                              <p:cond delay="0"/>
-                            </p:stCondLst>
-                            <p:childTnLst>
-                              <p:par>
-                                <p:cTn id="21" presetID="2" presetClass="entr" presetSubtype="4" fill="hold" nodeType="clickEffect">
-                                  <p:stCondLst>
-                                    <p:cond delay="0"/>
-                                  </p:stCondLst>
-                                  <p:childTnLst>
-                                    <p:set>
-                                      <p:cBhvr>
-                                        <p:cTn id="22" dur="1" fill="hold">
-                                          <p:stCondLst>
-                                            <p:cond delay="0"/>
-                                          </p:stCondLst>
-                                        </p:cTn>
-                                        <p:tgtEl>
-                                          <p:spTgt spid="7"/>
-                                        </p:tgtEl>
-                                        <p:attrNameLst>
-                                          <p:attrName>style.visibility</p:attrName>
-                                        </p:attrNameLst>
-                                      </p:cBhvr>
-                                      <p:to>
-                                        <p:strVal val="visible"/>
-                                      </p:to>
-                                    </p:set>
-                                    <p:anim calcmode="lin" valueType="num">
-                                      <p:cBhvr additive="base">
-                                        <p:cTn id="23" dur="250" fill="hold"/>
-                                        <p:tgtEl>
-                                          <p:spTgt spid="7"/>
-                                        </p:tgtEl>
-                                        <p:attrNameLst>
-                                          <p:attrName>ppt_x</p:attrName>
-                                        </p:attrNameLst>
-                                      </p:cBhvr>
-                                      <p:tavLst>
-                                        <p:tav tm="0">
-                                          <p:val>
-                                            <p:strVal val="#ppt_x"/>
-                                          </p:val>
-                                        </p:tav>
-                                        <p:tav tm="100000">
-                                          <p:val>
-                                            <p:strVal val="#ppt_x"/>
-                                          </p:val>
-                                        </p:tav>
-                                      </p:tavLst>
-                                    </p:anim>
-                                    <p:anim calcmode="lin" valueType="num">
-                                      <p:cBhvr additive="base">
-                                        <p:cTn id="24" dur="250" fill="hold"/>
-                                        <p:tgtEl>
-                                          <p:spTgt spid="7"/>
-                                        </p:tgtEl>
-                                        <p:attrNameLst>
-                                          <p:attrName>ppt_y</p:attrName>
-                                        </p:attrNameLst>
-                                      </p:cBhvr>
-                                      <p:tavLst>
-                                        <p:tav tm="0">
-                                          <p:val>
-                                            <p:strVal val="1+#ppt_h/2"/>
-                                          </p:val>
-                                        </p:tav>
-                                        <p:tav tm="100000">
-                                          <p:val>
-                                            <p:strVal val="#ppt_y"/>
-                                          </p:val>
-                                        </p:tav>
-                                      </p:tavLst>
-                                    </p:anim>
-                                  </p:childTnLst>
-                                </p:cTn>
-                              </p:par>
-                            </p:childTnLst>
-                          </p:cTn>
-                        </p:par>
-                      </p:childTnLst>
-                    </p:cTn>
-                  </p:par>
-                  <p:par>
-                    <p:cTn id="25" fill="hold">
-                      <p:stCondLst>
-                        <p:cond delay="indefinite"/>
-                      </p:stCondLst>
-                      <p:childTnLst>
-                        <p:par>
-                          <p:cTn id="26" fill="hold">
-                            <p:stCondLst>
-                              <p:cond delay="0"/>
-                            </p:stCondLst>
-                            <p:childTnLst>
-                              <p:par>
-                                <p:cTn id="27" presetID="1" presetClass="exit" presetSubtype="0" fill="hold" nodeType="clickEffect">
-                                  <p:stCondLst>
-                                    <p:cond delay="0"/>
-                                  </p:stCondLst>
-                                  <p:childTnLst>
-                                    <p:set>
-                                      <p:cBhvr>
-                                        <p:cTn id="28" dur="1" fill="hold">
-                                          <p:stCondLst>
-                                            <p:cond delay="0"/>
-                                          </p:stCondLst>
-                                        </p:cTn>
-                                        <p:tgtEl>
-                                          <p:spTgt spid="1026"/>
-                                        </p:tgtEl>
-                                        <p:attrNameLst>
-                                          <p:attrName>style.visibility</p:attrName>
-                                        </p:attrNameLst>
-                                      </p:cBhvr>
-                                      <p:to>
-                                        <p:strVal val="hidden"/>
-                                      </p:to>
-                                    </p:set>
-                                  </p:childTnLst>
-                                </p:cTn>
-                              </p:par>
-                              <p:par>
-                                <p:cTn id="29" presetID="1" presetClass="exit" presetSubtype="0" fill="hold" nodeType="withEffect">
-                                  <p:stCondLst>
-                                    <p:cond delay="0"/>
-                                  </p:stCondLst>
-                                  <p:childTnLst>
-                                    <p:set>
-                                      <p:cBhvr>
-                                        <p:cTn id="30" dur="1" fill="hold">
-                                          <p:stCondLst>
-                                            <p:cond delay="0"/>
-                                          </p:stCondLst>
-                                        </p:cTn>
-                                        <p:tgtEl>
-                                          <p:spTgt spid="7"/>
-                                        </p:tgtEl>
-                                        <p:attrNameLst>
-                                          <p:attrName>style.visibility</p:attrName>
-                                        </p:attrNameLst>
-                                      </p:cBhvr>
-                                      <p:to>
-                                        <p:strVal val="hidden"/>
-                                      </p:to>
-                                    </p:set>
-                                  </p:childTnLst>
-                                </p:cTn>
-                              </p:par>
-                              <p:par>
-                                <p:cTn id="31" presetID="1" presetClass="entr" presetSubtype="0" fill="hold" grpId="0" nodeType="withEffect">
-                                  <p:stCondLst>
-                                    <p:cond delay="0"/>
-                                  </p:stCondLst>
-                                  <p:childTnLst>
-                                    <p:set>
-                                      <p:cBhvr>
-                                        <p:cTn id="32" dur="1" fill="hold">
-                                          <p:stCondLst>
-                                            <p:cond delay="0"/>
-                                          </p:stCondLst>
-                                        </p:cTn>
-                                        <p:tgtEl>
-                                          <p:spTgt spid="3">
-                                            <p:txEl>
-                                              <p:pRg st="3" end="3"/>
-                                            </p:txEl>
-                                          </p:spTgt>
-                                        </p:tgtEl>
-                                        <p:attrNameLst>
-                                          <p:attrName>style.visibility</p:attrName>
-                                        </p:attrNameLst>
-                                      </p:cBhvr>
-                                      <p:to>
-                                        <p:strVal val="visible"/>
-                                      </p:to>
-                                    </p:set>
-                                  </p:childTnLst>
-                                </p:cTn>
-                              </p:par>
-                            </p:childTnLst>
-                          </p:cTn>
-                        </p:par>
-                      </p:childTnLst>
-                    </p:cTn>
-                  </p:par>
-                  <p:par>
-                    <p:cTn id="33" fill="hold">
-                      <p:stCondLst>
-                        <p:cond delay="indefinite"/>
-                      </p:stCondLst>
-                      <p:childTnLst>
-                        <p:par>
-                          <p:cTn id="34" fill="hold">
-                            <p:stCondLst>
-                              <p:cond delay="0"/>
-                            </p:stCondLst>
-                            <p:childTnLst>
-                              <p:par>
-                                <p:cTn id="35" presetID="2" presetClass="entr" presetSubtype="4" fill="hold" nodeType="clickEffect">
-                                  <p:stCondLst>
-                                    <p:cond delay="0"/>
-                                  </p:stCondLst>
-                                  <p:childTnLst>
-                                    <p:set>
-                                      <p:cBhvr>
-                                        <p:cTn id="36" dur="1" fill="hold">
-                                          <p:stCondLst>
-                                            <p:cond delay="0"/>
-                                          </p:stCondLst>
-                                        </p:cTn>
-                                        <p:tgtEl>
-                                          <p:spTgt spid="9"/>
-                                        </p:tgtEl>
-                                        <p:attrNameLst>
-                                          <p:attrName>style.visibility</p:attrName>
-                                        </p:attrNameLst>
-                                      </p:cBhvr>
-                                      <p:to>
-                                        <p:strVal val="visible"/>
-                                      </p:to>
-                                    </p:set>
-                                    <p:anim calcmode="lin" valueType="num">
-                                      <p:cBhvr additive="base">
-                                        <p:cTn id="37" dur="250" fill="hold"/>
-                                        <p:tgtEl>
-                                          <p:spTgt spid="9"/>
-                                        </p:tgtEl>
-                                        <p:attrNameLst>
-                                          <p:attrName>ppt_x</p:attrName>
-                                        </p:attrNameLst>
-                                      </p:cBhvr>
-                                      <p:tavLst>
-                                        <p:tav tm="0">
-                                          <p:val>
-                                            <p:strVal val="#ppt_x"/>
-                                          </p:val>
-                                        </p:tav>
-                                        <p:tav tm="100000">
-                                          <p:val>
-                                            <p:strVal val="#ppt_x"/>
-                                          </p:val>
-                                        </p:tav>
-                                      </p:tavLst>
-                                    </p:anim>
-                                    <p:anim calcmode="lin" valueType="num">
-                                      <p:cBhvr additive="base">
-                                        <p:cTn id="38" dur="250" fill="hold"/>
-                                        <p:tgtEl>
-                                          <p:spTgt spid="9"/>
-                                        </p:tgtEl>
-                                        <p:attrNameLst>
-                                          <p:attrName>ppt_y</p:attrName>
-                                        </p:attrNameLst>
-                                      </p:cBhvr>
-                                      <p:tavLst>
-                                        <p:tav tm="0">
-                                          <p:val>
-                                            <p:strVal val="1+#ppt_h/2"/>
-                                          </p:val>
-                                        </p:tav>
-                                        <p:tav tm="100000">
-                                          <p:val>
-                                            <p:strVal val="#ppt_y"/>
-                                          </p:val>
-                                        </p:tav>
-                                      </p:tavLst>
-                                    </p:anim>
-                                  </p:childTnLst>
-                                </p:cTn>
-                              </p:par>
-                            </p:childTnLst>
-                          </p:cTn>
-                        </p:par>
-                      </p:childTnLst>
-                    </p:cTn>
-                  </p:par>
-                </p:childTnLst>
-              </p:cTn>
-              <p:prevCondLst>
-                <p:cond evt="onPrev" delay="0">
-                  <p:tgtEl>
-                    <p:sldTgt/>
-                  </p:tgtEl>
-                </p:cond>
-              </p:prevCondLst>
-              <p:nextCondLst>
-                <p:cond evt="onNext" delay="0">
-                  <p:tgtEl>
-                    <p:sldTgt/>
-                  </p:tgtEl>
-                </p:cond>
-              </p:nextCondLst>
-            </p:seq>
-          </p:childTnLst>
-        </p:cTn>
-      </p:par>
-    </p:tnLst>
-    <p:bldLst>
-      <p:bldP spid="3" grpId="0" uiExpand="1" build="p"/>
-    </p:bldLst>
-  </p:timing>
-</p:sld>
-</file>
-
-<file path=ppt/slides/slide4.xml><?xml version="1.0" encoding="utf-8"?>
-<p:sld xmlns:a="http://schemas.openxmlformats.org/drawingml/2006/main" xmlns:r="http://schemas.openxmlformats.org/officeDocument/2006/relationships" xmlns:p="http://schemas.openxmlformats.org/presentationml/2006/main">
-  <p:cSld>
-    <p:spTree>
-      <p:nvGrpSpPr>
-        <p:cNvPr id="1" name=""/>
-        <p:cNvGrpSpPr/>
-        <p:nvPr/>
-      </p:nvGrpSpPr>
-      <p:grpSpPr>
-        <a:xfrm>
-          <a:off x="0" y="0"/>
-          <a:ext cx="0" cy="0"/>
-          <a:chOff x="0" y="0"/>
-          <a:chExt cx="0" cy="0"/>
-        </a:xfrm>
-      </p:grpSpPr>
-      <p:sp>
-        <p:nvSpPr>
-          <p:cNvPr id="2" name="Title 1">
-            <a:extLst>
-              <a:ext uri="{FF2B5EF4-FFF2-40B4-BE49-F238E27FC236}">
-                <a16:creationId xmlns:a16="http://schemas.microsoft.com/office/drawing/2014/main" id="{79EBC8E0-548A-414F-AAB9-51C713C34F27}"/>
-              </a:ext>
-            </a:extLst>
-          </p:cNvPr>
-          <p:cNvSpPr>
-            <a:spLocks noGrp="1"/>
-          </p:cNvSpPr>
-          <p:nvPr>
-            <p:ph type="title"/>
-          </p:nvPr>
-        </p:nvSpPr>
-        <p:spPr/>
-        <p:txBody>
-          <a:bodyPr/>
-          <a:lstStyle/>
-          <a:p>
-            <a:r>
-              <a:rPr lang="en-IN" dirty="0"/>
-              <a:t>Main Attack Idea</a:t>
-            </a:r>
-          </a:p>
-        </p:txBody>
-      </p:sp>
-      <p:sp>
-        <p:nvSpPr>
-          <p:cNvPr id="3" name="Content Placeholder 2">
-            <a:extLst>
-              <a:ext uri="{FF2B5EF4-FFF2-40B4-BE49-F238E27FC236}">
-                <a16:creationId xmlns:a16="http://schemas.microsoft.com/office/drawing/2014/main" id="{BF05E424-3502-419D-A664-F3A24FDB87BC}"/>
-              </a:ext>
-            </a:extLst>
-          </p:cNvPr>
-          <p:cNvSpPr>
-            <a:spLocks noGrp="1"/>
-          </p:cNvSpPr>
-          <p:nvPr>
-            <p:ph idx="1"/>
-          </p:nvPr>
-        </p:nvSpPr>
-        <p:spPr/>
-        <p:txBody>
-          <a:bodyPr>
-            <a:normAutofit/>
-          </a:bodyPr>
-          <a:lstStyle/>
-          <a:p>
-            <a:pPr algn="just"/>
-            <a:r>
-              <a:rPr lang="en-IN" dirty="0"/>
-              <a:t>Threat Model</a:t>
-            </a:r>
-            <a:endParaRPr lang="en-GB" dirty="0"/>
-          </a:p>
-          <a:p>
-            <a:pPr lvl="1" algn="just"/>
-            <a:r>
-              <a:rPr lang="en-GB" dirty="0"/>
-              <a:t>Uses a generative RNN based approach to generate irreverent APIs and insert them into the original API sequences.</a:t>
-            </a:r>
-          </a:p>
-          <a:p>
-            <a:pPr lvl="1" algn="just"/>
-            <a:r>
-              <a:rPr lang="en-GB" dirty="0"/>
-              <a:t>A substitute RNN is trained to fit the victim RNN.</a:t>
-            </a:r>
-          </a:p>
-          <a:p>
-            <a:pPr lvl="1" algn="just"/>
-            <a:r>
-              <a:rPr lang="en-GB" dirty="0"/>
-              <a:t>Gumbel-</a:t>
-            </a:r>
-            <a:r>
-              <a:rPr lang="en-GB" dirty="0" err="1"/>
-              <a:t>Softmax</a:t>
-            </a:r>
-            <a:r>
-              <a:rPr lang="en-GB" dirty="0"/>
-              <a:t> is used to smooth the API symbols and deliver gradient information between the generative RNN and the substitute RNN.</a:t>
-            </a:r>
-            <a:endParaRPr lang="en-IN" dirty="0"/>
-          </a:p>
-        </p:txBody>
-      </p:sp>
-      <p:sp>
-        <p:nvSpPr>
-          <p:cNvPr id="4" name="Slide Number Placeholder 3">
-            <a:extLst>
-              <a:ext uri="{FF2B5EF4-FFF2-40B4-BE49-F238E27FC236}">
-                <a16:creationId xmlns:a16="http://schemas.microsoft.com/office/drawing/2014/main" id="{38A7CD3C-BE9C-4CB1-83C7-0A7F6DB18029}"/>
-              </a:ext>
-            </a:extLst>
-          </p:cNvPr>
-          <p:cNvSpPr>
-            <a:spLocks noGrp="1"/>
-          </p:cNvSpPr>
-          <p:nvPr>
-            <p:ph type="sldNum" sz="quarter" idx="12"/>
-          </p:nvPr>
-        </p:nvSpPr>
-        <p:spPr/>
-        <p:txBody>
-          <a:bodyPr/>
-          <a:lstStyle/>
-          <a:p>
-            <a:fld id="{82BC92B1-C9EA-4D86-A246-22CEB90EE2A6}" type="slidenum">
-              <a:rPr lang="en-IN" smtClean="0"/>
-              <a:t>4</a:t>
-            </a:fld>
-            <a:endParaRPr lang="en-IN"/>
-          </a:p>
-        </p:txBody>
-      </p:sp>
-      <p:sp>
-        <p:nvSpPr>
-          <p:cNvPr id="5" name="Date Placeholder 4">
-            <a:extLst>
-              <a:ext uri="{FF2B5EF4-FFF2-40B4-BE49-F238E27FC236}">
-                <a16:creationId xmlns:a16="http://schemas.microsoft.com/office/drawing/2014/main" id="{0FBDB21C-5A04-4DD3-8B72-73CC37E33CA9}"/>
-              </a:ext>
-            </a:extLst>
-          </p:cNvPr>
-          <p:cNvSpPr>
-            <a:spLocks noGrp="1"/>
-          </p:cNvSpPr>
-          <p:nvPr>
-            <p:ph type="dt" sz="half" idx="10"/>
-          </p:nvPr>
-        </p:nvSpPr>
-        <p:spPr/>
-        <p:txBody>
-          <a:bodyPr/>
-          <a:lstStyle/>
-          <a:p>
-            <a:fld id="{E7374EA0-DAF7-4C60-8CEF-4C3B065629DE}" type="datetime1">
-              <a:rPr lang="en-IN" smtClean="0"/>
-              <a:t>11-10-2017</a:t>
-            </a:fld>
-            <a:endParaRPr lang="en-IN"/>
-          </a:p>
-        </p:txBody>
-      </p:sp>
-    </p:spTree>
-    <p:extLst>
-      <p:ext uri="{BB962C8B-B14F-4D97-AF65-F5344CB8AC3E}">
-        <p14:creationId xmlns:p14="http://schemas.microsoft.com/office/powerpoint/2010/main" val="2439230405"/>
-      </p:ext>
-    </p:extLst>
-  </p:cSld>
-  <p:clrMapOvr>
-    <a:masterClrMapping/>
-  </p:clrMapOvr>
-  <p:timing>
-    <p:tnLst>
-      <p:par>
-        <p:cTn id="1" dur="indefinite" restart="never" nodeType="tmRoot">
-          <p:childTnLst>
-            <p:seq concurrent="1" nextAc="seek">
-              <p:cTn id="2" dur="indefinite" nodeType="mainSeq">
-                <p:childTnLst>
-                  <p:par>
-                    <p:cTn id="3" fill="hold">
-                      <p:stCondLst>
-                        <p:cond delay="indefinite"/>
-                      </p:stCondLst>
-                      <p:childTnLst>
-                        <p:par>
-                          <p:cTn id="4" fill="hold">
-                            <p:stCondLst>
-                              <p:cond delay="0"/>
-                            </p:stCondLst>
-                            <p:childTnLst>
-                              <p:par>
-                                <p:cTn id="5" presetID="1" presetClass="entr" presetSubtype="0" fill="hold" grpId="0" nodeType="clickEffect">
-                                  <p:stCondLst>
-                                    <p:cond delay="0"/>
-                                  </p:stCondLst>
-                                  <p:childTnLst>
-                                    <p:set>
-                                      <p:cBhvr>
-                                        <p:cTn id="6" dur="1" fill="hold">
-                                          <p:stCondLst>
-                                            <p:cond delay="0"/>
-                                          </p:stCondLst>
-                                        </p:cTn>
-                                        <p:tgtEl>
-                                          <p:spTgt spid="3">
-                                            <p:txEl>
-                                              <p:pRg st="0" end="0"/>
-                                            </p:txEl>
-                                          </p:spTgt>
-                                        </p:tgtEl>
-                                        <p:attrNameLst>
-                                          <p:attrName>style.visibility</p:attrName>
-                                        </p:attrNameLst>
-                                      </p:cBhvr>
-                                      <p:to>
-                                        <p:strVal val="visible"/>
-                                      </p:to>
-                                    </p:set>
-                                  </p:childTnLst>
-                                </p:cTn>
-                              </p:par>
-                              <p:par>
-                                <p:cTn id="7" presetID="1" presetClass="entr" presetSubtype="0" fill="hold" grpId="0" nodeType="withEffect">
-                                  <p:stCondLst>
-                                    <p:cond delay="0"/>
-                                  </p:stCondLst>
-                                  <p:childTnLst>
-                                    <p:set>
-                                      <p:cBhvr>
-                                        <p:cTn id="8" dur="1" fill="hold">
-                                          <p:stCondLst>
-                                            <p:cond delay="0"/>
-                                          </p:stCondLst>
-                                        </p:cTn>
-                                        <p:tgtEl>
-                                          <p:spTgt spid="3">
-                                            <p:txEl>
-                                              <p:pRg st="1" end="1"/>
-                                            </p:txEl>
-                                          </p:spTgt>
-                                        </p:tgtEl>
-                                        <p:attrNameLst>
-                                          <p:attrName>style.visibility</p:attrName>
-                                        </p:attrNameLst>
-                                      </p:cBhvr>
-                                      <p:to>
-                                        <p:strVal val="visible"/>
-                                      </p:to>
-                                    </p:set>
-                                  </p:childTnLst>
-                                </p:cTn>
-                              </p:par>
-                            </p:childTnLst>
-                          </p:cTn>
-                        </p:par>
-                      </p:childTnLst>
-                    </p:cTn>
-                  </p:par>
-                  <p:par>
-                    <p:cTn id="9" fill="hold">
-                      <p:stCondLst>
-                        <p:cond delay="indefinite"/>
-                      </p:stCondLst>
-                      <p:childTnLst>
-                        <p:par>
-                          <p:cTn id="10" fill="hold">
-                            <p:stCondLst>
-                              <p:cond delay="0"/>
-                            </p:stCondLst>
-                            <p:childTnLst>
-                              <p:par>
-                                <p:cTn id="11" presetID="1" presetClass="entr" presetSubtype="0" fill="hold" grpId="0" nodeType="clickEffect">
-                                  <p:stCondLst>
-                                    <p:cond delay="0"/>
-                                  </p:stCondLst>
-                                  <p:childTnLst>
-                                    <p:set>
-                                      <p:cBhvr>
-                                        <p:cTn id="12" dur="1" fill="hold">
-                                          <p:stCondLst>
-                                            <p:cond delay="0"/>
-                                          </p:stCondLst>
-                                        </p:cTn>
-                                        <p:tgtEl>
-                                          <p:spTgt spid="3">
-                                            <p:txEl>
-                                              <p:pRg st="2" end="2"/>
-                                            </p:txEl>
-                                          </p:spTgt>
-                                        </p:tgtEl>
-                                        <p:attrNameLst>
-                                          <p:attrName>style.visibility</p:attrName>
-                                        </p:attrNameLst>
-                                      </p:cBhvr>
-                                      <p:to>
-                                        <p:strVal val="visible"/>
-                                      </p:to>
-                                    </p:set>
-                                  </p:childTnLst>
-                                </p:cTn>
-                              </p:par>
-                            </p:childTnLst>
-                          </p:cTn>
-                        </p:par>
-                      </p:childTnLst>
-                    </p:cTn>
-                  </p:par>
-                  <p:par>
-                    <p:cTn id="13" fill="hold">
-                      <p:stCondLst>
-                        <p:cond delay="indefinite"/>
-                      </p:stCondLst>
-                      <p:childTnLst>
-                        <p:par>
-                          <p:cTn id="14" fill="hold">
-                            <p:stCondLst>
-                              <p:cond delay="0"/>
-                            </p:stCondLst>
-                            <p:childTnLst>
-                              <p:par>
-                                <p:cTn id="15" presetID="1" presetClass="entr" presetSubtype="0" fill="hold" grpId="0" nodeType="clickEffect">
-                                  <p:stCondLst>
-                                    <p:cond delay="0"/>
-                                  </p:stCondLst>
-                                  <p:childTnLst>
-                                    <p:set>
-                                      <p:cBhvr>
-                                        <p:cTn id="16" dur="1" fill="hold">
-                                          <p:stCondLst>
-                                            <p:cond delay="0"/>
-                                          </p:stCondLst>
-                                        </p:cTn>
-                                        <p:tgtEl>
-                                          <p:spTgt spid="3">
-                                            <p:txEl>
-                                              <p:pRg st="3" end="3"/>
-                                            </p:txEl>
-                                          </p:spTgt>
-                                        </p:tgtEl>
-                                        <p:attrNameLst>
-                                          <p:attrName>style.visibility</p:attrName>
-                                        </p:attrNameLst>
-                                      </p:cBhvr>
-                                      <p:to>
-                                        <p:strVal val="visible"/>
-                                      </p:to>
-                                    </p:set>
-                                  </p:childTnLst>
-                                </p:cTn>
-                              </p:par>
-                            </p:childTnLst>
-                          </p:cTn>
-                        </p:par>
-                      </p:childTnLst>
-                    </p:cTn>
-                  </p:par>
-                </p:childTnLst>
-              </p:cTn>
-              <p:prevCondLst>
-                <p:cond evt="onPrev" delay="0">
-                  <p:tgtEl>
-                    <p:sldTgt/>
-                  </p:tgtEl>
-                </p:cond>
-              </p:prevCondLst>
-              <p:nextCondLst>
-                <p:cond evt="onNext" delay="0">
-                  <p:tgtEl>
-                    <p:sldTgt/>
-                  </p:tgtEl>
-                </p:cond>
-              </p:nextCondLst>
-            </p:seq>
-          </p:childTnLst>
-        </p:cTn>
-      </p:par>
-    </p:tnLst>
-    <p:bldLst>
-      <p:bldP spid="3" grpId="0" uiExpand="1" build="p"/>
-    </p:bldLst>
-  </p:timing>
-</p:sld>
-</file>
-
-<file path=ppt/slides/slide5.xml><?xml version="1.0" encoding="utf-8"?>
-<p:sld xmlns:a="http://schemas.openxmlformats.org/drawingml/2006/main" xmlns:r="http://schemas.openxmlformats.org/officeDocument/2006/relationships" xmlns:p="http://schemas.openxmlformats.org/presentationml/2006/main">
-  <p:cSld>
-    <p:spTree>
-      <p:nvGrpSpPr>
-        <p:cNvPr id="1" name=""/>
-        <p:cNvGrpSpPr/>
-        <p:nvPr/>
-      </p:nvGrpSpPr>
-      <p:grpSpPr>
-        <a:xfrm>
-          <a:off x="0" y="0"/>
-          <a:ext cx="0" cy="0"/>
-          <a:chOff x="0" y="0"/>
-          <a:chExt cx="0" cy="0"/>
-        </a:xfrm>
-      </p:grpSpPr>
-      <p:sp>
-        <p:nvSpPr>
-          <p:cNvPr id="2" name="Title 1">
-            <a:extLst>
-              <a:ext uri="{FF2B5EF4-FFF2-40B4-BE49-F238E27FC236}">
                 <a16:creationId xmlns:a16="http://schemas.microsoft.com/office/drawing/2014/main" id="{13FB4029-B167-490B-B5FE-118E8567EAE9}"/>
               </a:ext>
             </a:extLst>
@@ -8335,7 +6814,7 @@
           <a:p>
             <a:fld id="{82BC92B1-C9EA-4D86-A246-22CEB90EE2A6}" type="slidenum">
               <a:rPr lang="en-IN" smtClean="0"/>
-              <a:t>5</a:t>
+              <a:t>3</a:t>
             </a:fld>
             <a:endParaRPr lang="en-IN"/>
           </a:p>
@@ -8420,7 +6899,7 @@
     </p:spTree>
     <p:extLst>
       <p:ext uri="{BB962C8B-B14F-4D97-AF65-F5344CB8AC3E}">
-        <p14:creationId xmlns:p14="http://schemas.microsoft.com/office/powerpoint/2010/main" val="1061915225"/>
+        <p14:creationId xmlns:p14="http://schemas.microsoft.com/office/powerpoint/2010/main" val="893073776"/>
       </p:ext>
     </p:extLst>
   </p:cSld>
@@ -8659,7 +7138,7 @@
 </p:sld>
 </file>
 
-<file path=ppt/slides/slide6.xml><?xml version="1.0" encoding="utf-8"?>
+<file path=ppt/slides/slide4.xml><?xml version="1.0" encoding="utf-8"?>
 <p:sld xmlns:a="http://schemas.openxmlformats.org/drawingml/2006/main" xmlns:r="http://schemas.openxmlformats.org/officeDocument/2006/relationships" xmlns:p="http://schemas.openxmlformats.org/presentationml/2006/main">
   <p:cSld>
     <p:spTree>
@@ -8704,8 +7183,8 @@
           </a:p>
         </p:txBody>
       </p:sp>
-      <mc:AlternateContent xmlns:mc="http://schemas.openxmlformats.org/markup-compatibility/2006">
-        <mc:Choice xmlns:a14="http://schemas.microsoft.com/office/drawing/2010/main" Requires="a14">
+      <mc:AlternateContent xmlns:mc="http://schemas.openxmlformats.org/markup-compatibility/2006" xmlns:a14="http://schemas.microsoft.com/office/drawing/2010/main">
+        <mc:Choice Requires="a14">
           <p:sp>
             <p:nvSpPr>
               <p:cNvPr id="3" name="Content Placeholder 2">
@@ -9219,7 +7698,7 @@
             </p:txBody>
           </p:sp>
         </mc:Choice>
-        <mc:Fallback>
+        <mc:Fallback xmlns="">
           <p:sp>
             <p:nvSpPr>
               <p:cNvPr id="3" name="Content Placeholder 2">
@@ -9282,7 +7761,7 @@
           <a:p>
             <a:fld id="{82BC92B1-C9EA-4D86-A246-22CEB90EE2A6}" type="slidenum">
               <a:rPr lang="en-IN" smtClean="0"/>
-              <a:t>6</a:t>
+              <a:t>4</a:t>
             </a:fld>
             <a:endParaRPr lang="en-IN"/>
           </a:p>
@@ -9367,7 +7846,7 @@
     </p:spTree>
     <p:extLst>
       <p:ext uri="{BB962C8B-B14F-4D97-AF65-F5344CB8AC3E}">
-        <p14:creationId xmlns:p14="http://schemas.microsoft.com/office/powerpoint/2010/main" val="2204226010"/>
+        <p14:creationId xmlns:p14="http://schemas.microsoft.com/office/powerpoint/2010/main" val="3115343780"/>
       </p:ext>
     </p:extLst>
   </p:cSld>
@@ -9686,7 +8165,7 @@
 </p:sld>
 </file>
 
-<file path=ppt/slides/slide7.xml><?xml version="1.0" encoding="utf-8"?>
+<file path=ppt/slides/slide5.xml><?xml version="1.0" encoding="utf-8"?>
 <p:sld xmlns:a="http://schemas.openxmlformats.org/drawingml/2006/main" xmlns:r="http://schemas.openxmlformats.org/officeDocument/2006/relationships" xmlns:p="http://schemas.openxmlformats.org/presentationml/2006/main">
   <p:cSld>
     <p:spTree>
@@ -9735,8 +8214,8 @@
           </a:p>
         </p:txBody>
       </p:sp>
-      <mc:AlternateContent xmlns:mc="http://schemas.openxmlformats.org/markup-compatibility/2006">
-        <mc:Choice xmlns:a14="http://schemas.microsoft.com/office/drawing/2010/main" Requires="a14">
+      <mc:AlternateContent xmlns:mc="http://schemas.openxmlformats.org/markup-compatibility/2006" xmlns:a14="http://schemas.microsoft.com/office/drawing/2010/main">
+        <mc:Choice Requires="a14">
           <p:sp>
             <p:nvSpPr>
               <p:cNvPr id="3" name="Content Placeholder 2">
@@ -10060,7 +8539,7 @@
             </p:txBody>
           </p:sp>
         </mc:Choice>
-        <mc:Fallback>
+        <mc:Fallback xmlns="">
           <p:sp>
             <p:nvSpPr>
               <p:cNvPr id="3" name="Content Placeholder 2">
@@ -10123,7 +8602,7 @@
           <a:p>
             <a:fld id="{82BC92B1-C9EA-4D86-A246-22CEB90EE2A6}" type="slidenum">
               <a:rPr lang="en-IN" smtClean="0"/>
-              <a:t>7</a:t>
+              <a:t>5</a:t>
             </a:fld>
             <a:endParaRPr lang="en-IN"/>
           </a:p>
@@ -10142,11 +8621,7 @@
             <a:graphicFrameLocks noGrp="1"/>
           </p:cNvGraphicFramePr>
           <p:nvPr>
-            <p:extLst>
-              <p:ext uri="{D42A27DB-BD31-4B8C-83A1-F6EECF244321}">
-                <p14:modId xmlns:p14="http://schemas.microsoft.com/office/powerpoint/2010/main" val="3542597711"/>
-              </p:ext>
-            </p:extLst>
+            <p:extLst/>
           </p:nvPr>
         </p:nvGraphicFramePr>
         <p:xfrm>
@@ -10614,7 +9089,7 @@
     </p:spTree>
     <p:extLst>
       <p:ext uri="{BB962C8B-B14F-4D97-AF65-F5344CB8AC3E}">
-        <p14:creationId xmlns:p14="http://schemas.microsoft.com/office/powerpoint/2010/main" val="1900246608"/>
+        <p14:creationId xmlns:p14="http://schemas.microsoft.com/office/powerpoint/2010/main" val="3218108741"/>
       </p:ext>
     </p:extLst>
   </p:cSld>
@@ -10944,7 +9419,7 @@
 </p:sld>
 </file>
 
-<file path=ppt/slides/slide8.xml><?xml version="1.0" encoding="utf-8"?>
+<file path=ppt/slides/slide6.xml><?xml version="1.0" encoding="utf-8"?>
 <p:sld xmlns:a="http://schemas.openxmlformats.org/drawingml/2006/main" xmlns:r="http://schemas.openxmlformats.org/officeDocument/2006/relationships" xmlns:p="http://schemas.openxmlformats.org/presentationml/2006/main">
   <p:cSld>
     <p:spTree>
@@ -10993,8 +9468,8 @@
           </a:p>
         </p:txBody>
       </p:sp>
-      <mc:AlternateContent xmlns:mc="http://schemas.openxmlformats.org/markup-compatibility/2006">
-        <mc:Choice xmlns:a14="http://schemas.microsoft.com/office/drawing/2010/main" Requires="a14">
+      <mc:AlternateContent xmlns:mc="http://schemas.openxmlformats.org/markup-compatibility/2006" xmlns:a14="http://schemas.microsoft.com/office/drawing/2010/main">
+        <mc:Choice Requires="a14">
           <p:sp>
             <p:nvSpPr>
               <p:cNvPr id="3" name="Content Placeholder 2">
@@ -11622,7 +10097,7 @@
             </p:txBody>
           </p:sp>
         </mc:Choice>
-        <mc:Fallback>
+        <mc:Fallback xmlns="">
           <p:sp>
             <p:nvSpPr>
               <p:cNvPr id="3" name="Content Placeholder 2">
@@ -11685,7 +10160,7 @@
           <a:p>
             <a:fld id="{82BC92B1-C9EA-4D86-A246-22CEB90EE2A6}" type="slidenum">
               <a:rPr lang="en-IN" smtClean="0"/>
-              <a:t>8</a:t>
+              <a:t>6</a:t>
             </a:fld>
             <a:endParaRPr lang="en-IN"/>
           </a:p>
@@ -11770,7 +10245,7 @@
     </p:spTree>
     <p:extLst>
       <p:ext uri="{BB962C8B-B14F-4D97-AF65-F5344CB8AC3E}">
-        <p14:creationId xmlns:p14="http://schemas.microsoft.com/office/powerpoint/2010/main" val="3426005448"/>
+        <p14:creationId xmlns:p14="http://schemas.microsoft.com/office/powerpoint/2010/main" val="2157019233"/>
       </p:ext>
     </p:extLst>
   </p:cSld>
@@ -12231,7 +10706,7 @@
 </p:sld>
 </file>
 
-<file path=ppt/slides/slide9.xml><?xml version="1.0" encoding="utf-8"?>
+<file path=ppt/slides/slide7.xml><?xml version="1.0" encoding="utf-8"?>
 <p:sld xmlns:a="http://schemas.openxmlformats.org/drawingml/2006/main" xmlns:r="http://schemas.openxmlformats.org/officeDocument/2006/relationships" xmlns:p="http://schemas.openxmlformats.org/presentationml/2006/main">
   <p:cSld>
     <p:spTree>
@@ -12280,8 +10755,8 @@
           </a:p>
         </p:txBody>
       </p:sp>
-      <mc:AlternateContent xmlns:mc="http://schemas.openxmlformats.org/markup-compatibility/2006">
-        <mc:Choice xmlns:a14="http://schemas.microsoft.com/office/drawing/2010/main" Requires="a14">
+      <mc:AlternateContent xmlns:mc="http://schemas.openxmlformats.org/markup-compatibility/2006" xmlns:a14="http://schemas.microsoft.com/office/drawing/2010/main">
+        <mc:Choice Requires="a14">
           <p:sp>
             <p:nvSpPr>
               <p:cNvPr id="3" name="Content Placeholder 2">
@@ -12396,7 +10871,7 @@
             </p:txBody>
           </p:sp>
         </mc:Choice>
-        <mc:Fallback>
+        <mc:Fallback xmlns="">
           <p:sp>
             <p:nvSpPr>
               <p:cNvPr id="3" name="Content Placeholder 2">
@@ -12459,7 +10934,7 @@
           <a:p>
             <a:fld id="{82BC92B1-C9EA-4D86-A246-22CEB90EE2A6}" type="slidenum">
               <a:rPr lang="en-IN" smtClean="0"/>
-              <a:t>9</a:t>
+              <a:t>7</a:t>
             </a:fld>
             <a:endParaRPr lang="en-IN"/>
           </a:p>
@@ -12544,7 +11019,7 @@
     </p:spTree>
     <p:extLst>
       <p:ext uri="{BB962C8B-B14F-4D97-AF65-F5344CB8AC3E}">
-        <p14:creationId xmlns:p14="http://schemas.microsoft.com/office/powerpoint/2010/main" val="755414517"/>
+        <p14:creationId xmlns:p14="http://schemas.microsoft.com/office/powerpoint/2010/main" val="981106299"/>
       </p:ext>
     </p:extLst>
   </p:cSld>
@@ -12728,6 +11203,1532 @@
                                           <p:spTgt spid="3">
                                             <p:txEl>
                                               <p:pRg st="1" end="1"/>
+                                            </p:txEl>
+                                          </p:spTgt>
+                                        </p:tgtEl>
+                                        <p:attrNameLst>
+                                          <p:attrName>style.visibility</p:attrName>
+                                        </p:attrNameLst>
+                                      </p:cBhvr>
+                                      <p:to>
+                                        <p:strVal val="visible"/>
+                                      </p:to>
+                                    </p:set>
+                                  </p:childTnLst>
+                                </p:cTn>
+                              </p:par>
+                            </p:childTnLst>
+                          </p:cTn>
+                        </p:par>
+                      </p:childTnLst>
+                    </p:cTn>
+                  </p:par>
+                </p:childTnLst>
+              </p:cTn>
+              <p:prevCondLst>
+                <p:cond evt="onPrev" delay="0">
+                  <p:tgtEl>
+                    <p:sldTgt/>
+                  </p:tgtEl>
+                </p:cond>
+              </p:prevCondLst>
+              <p:nextCondLst>
+                <p:cond evt="onNext" delay="0">
+                  <p:tgtEl>
+                    <p:sldTgt/>
+                  </p:tgtEl>
+                </p:cond>
+              </p:nextCondLst>
+            </p:seq>
+          </p:childTnLst>
+        </p:cTn>
+      </p:par>
+    </p:tnLst>
+    <p:bldLst>
+      <p:bldP spid="3" grpId="0" uiExpand="1" build="p"/>
+    </p:bldLst>
+  </p:timing>
+</p:sld>
+</file>
+
+<file path=ppt/slides/slide8.xml><?xml version="1.0" encoding="utf-8"?>
+<p:sld xmlns:a="http://schemas.openxmlformats.org/drawingml/2006/main" xmlns:r="http://schemas.openxmlformats.org/officeDocument/2006/relationships" xmlns:p="http://schemas.openxmlformats.org/presentationml/2006/main">
+  <p:cSld>
+    <p:spTree>
+      <p:nvGrpSpPr>
+        <p:cNvPr id="1" name=""/>
+        <p:cNvGrpSpPr/>
+        <p:nvPr/>
+      </p:nvGrpSpPr>
+      <p:grpSpPr>
+        <a:xfrm>
+          <a:off x="0" y="0"/>
+          <a:ext cx="0" cy="0"/>
+          <a:chOff x="0" y="0"/>
+          <a:chExt cx="0" cy="0"/>
+        </a:xfrm>
+      </p:grpSpPr>
+      <p:sp>
+        <p:nvSpPr>
+          <p:cNvPr id="2" name="Title 1">
+            <a:extLst>
+              <a:ext uri="{FF2B5EF4-FFF2-40B4-BE49-F238E27FC236}">
+                <a16:creationId xmlns:a16="http://schemas.microsoft.com/office/drawing/2014/main" id="{79EBC8E0-548A-414F-AAB9-51C713C34F27}"/>
+              </a:ext>
+            </a:extLst>
+          </p:cNvPr>
+          <p:cNvSpPr>
+            <a:spLocks noGrp="1"/>
+          </p:cNvSpPr>
+          <p:nvPr>
+            <p:ph type="title"/>
+          </p:nvPr>
+        </p:nvSpPr>
+        <p:spPr/>
+        <p:txBody>
+          <a:bodyPr/>
+          <a:lstStyle/>
+          <a:p>
+            <a:r>
+              <a:rPr lang="en-IN" dirty="0"/>
+              <a:t>Main Attack Idea</a:t>
+            </a:r>
+          </a:p>
+        </p:txBody>
+      </p:sp>
+      <p:sp>
+        <p:nvSpPr>
+          <p:cNvPr id="3" name="Content Placeholder 2">
+            <a:extLst>
+              <a:ext uri="{FF2B5EF4-FFF2-40B4-BE49-F238E27FC236}">
+                <a16:creationId xmlns:a16="http://schemas.microsoft.com/office/drawing/2014/main" id="{BF05E424-3502-419D-A664-F3A24FDB87BC}"/>
+              </a:ext>
+            </a:extLst>
+          </p:cNvPr>
+          <p:cNvSpPr>
+            <a:spLocks noGrp="1"/>
+          </p:cNvSpPr>
+          <p:nvPr>
+            <p:ph idx="1"/>
+          </p:nvPr>
+        </p:nvSpPr>
+        <p:spPr/>
+        <p:txBody>
+          <a:bodyPr>
+            <a:normAutofit/>
+          </a:bodyPr>
+          <a:lstStyle/>
+          <a:p>
+            <a:pPr algn="just"/>
+            <a:r>
+              <a:rPr lang="en-IN" dirty="0"/>
+              <a:t>Challenge</a:t>
+            </a:r>
+          </a:p>
+          <a:p>
+            <a:pPr lvl="1" algn="just"/>
+            <a:r>
+              <a:rPr lang="en-GB" dirty="0"/>
+              <a:t>Existing researches on adversarial samples mainly focus on images, which are represented as matrices with fixed dimensions, and the values of the matrices are continuous.</a:t>
+            </a:r>
+          </a:p>
+          <a:p>
+            <a:pPr lvl="1" algn="just"/>
+            <a:r>
+              <a:rPr lang="en-GB" dirty="0"/>
+              <a:t>API sequences consist of discrete symbols with variable lengths. Hence, generating adversarial examples for API sequences will become quite different from images.</a:t>
+            </a:r>
+          </a:p>
+          <a:p>
+            <a:pPr lvl="1" algn="just"/>
+            <a:r>
+              <a:rPr lang="en-GB" dirty="0"/>
+              <a:t>Adversarial examples are generated from API sequences by inserting some irreverent APIs into the original sequences. Removing an API from the API sequence may make the program unable to work. How to insert irreverent APIs into the sequence is the key to generate adversarial examples.</a:t>
+            </a:r>
+            <a:endParaRPr lang="en-IN" dirty="0"/>
+          </a:p>
+        </p:txBody>
+      </p:sp>
+      <p:pic>
+        <p:nvPicPr>
+          <p:cNvPr id="1026" name="Picture 2" descr="Image result for image and corresponding matrix">
+            <a:extLst>
+              <a:ext uri="{FF2B5EF4-FFF2-40B4-BE49-F238E27FC236}">
+                <a16:creationId xmlns:a16="http://schemas.microsoft.com/office/drawing/2014/main" id="{0A073AF4-441A-4F2C-9857-CB15D49D8721}"/>
+              </a:ext>
+            </a:extLst>
+          </p:cNvPr>
+          <p:cNvPicPr>
+            <a:picLocks noChangeAspect="1" noChangeArrowheads="1"/>
+          </p:cNvPicPr>
+          <p:nvPr/>
+        </p:nvPicPr>
+        <p:blipFill>
+          <a:blip r:embed="rId2">
+            <a:extLst>
+              <a:ext uri="{28A0092B-C50C-407E-A947-70E740481C1C}">
+                <a14:useLocalDpi xmlns:a14="http://schemas.microsoft.com/office/drawing/2010/main" val="0"/>
+              </a:ext>
+            </a:extLst>
+          </a:blip>
+          <a:srcRect/>
+          <a:stretch>
+            <a:fillRect/>
+          </a:stretch>
+        </p:blipFill>
+        <p:spPr bwMode="auto">
+          <a:xfrm>
+            <a:off x="1069848" y="4991100"/>
+            <a:ext cx="3949827" cy="1627059"/>
+          </a:xfrm>
+          <a:prstGeom prst="rect">
+            <a:avLst/>
+          </a:prstGeom>
+          <a:noFill/>
+          <a:extLst>
+            <a:ext uri="{909E8E84-426E-40DD-AFC4-6F175D3DCCD1}">
+              <a14:hiddenFill xmlns:a14="http://schemas.microsoft.com/office/drawing/2010/main">
+                <a:solidFill>
+                  <a:srgbClr val="FFFFFF"/>
+                </a:solidFill>
+              </a14:hiddenFill>
+            </a:ext>
+          </a:extLst>
+        </p:spPr>
+      </p:pic>
+      <p:graphicFrame>
+        <p:nvGraphicFramePr>
+          <p:cNvPr id="7" name="Table 6">
+            <a:extLst>
+              <a:ext uri="{FF2B5EF4-FFF2-40B4-BE49-F238E27FC236}">
+                <a16:creationId xmlns:a16="http://schemas.microsoft.com/office/drawing/2014/main" id="{763FB12E-4CFE-476D-BC09-D5ABD594291B}"/>
+              </a:ext>
+            </a:extLst>
+          </p:cNvPr>
+          <p:cNvGraphicFramePr>
+            <a:graphicFrameLocks noGrp="1"/>
+          </p:cNvGraphicFramePr>
+          <p:nvPr>
+            <p:extLst>
+              <p:ext uri="{D42A27DB-BD31-4B8C-83A1-F6EECF244321}">
+                <p14:modId xmlns:p14="http://schemas.microsoft.com/office/powerpoint/2010/main" val="3200830709"/>
+              </p:ext>
+            </p:extLst>
+          </p:nvPr>
+        </p:nvGraphicFramePr>
+        <p:xfrm>
+          <a:off x="6584823" y="5248369"/>
+          <a:ext cx="3790778" cy="1112520"/>
+        </p:xfrm>
+        <a:graphic>
+          <a:graphicData uri="http://schemas.openxmlformats.org/drawingml/2006/table">
+            <a:tbl>
+              <a:tblPr firstRow="1" bandRow="1">
+                <a:tableStyleId>{5C22544A-7EE6-4342-B048-85BDC9FD1C3A}</a:tableStyleId>
+              </a:tblPr>
+              <a:tblGrid>
+                <a:gridCol w="887730">
+                  <a:extLst>
+                    <a:ext uri="{9D8B030D-6E8A-4147-A177-3AD203B41FA5}">
+                      <a16:colId xmlns:a16="http://schemas.microsoft.com/office/drawing/2014/main" val="4191620136"/>
+                    </a:ext>
+                  </a:extLst>
+                </a:gridCol>
+                <a:gridCol w="2903048">
+                  <a:extLst>
+                    <a:ext uri="{9D8B030D-6E8A-4147-A177-3AD203B41FA5}">
+                      <a16:colId xmlns:a16="http://schemas.microsoft.com/office/drawing/2014/main" val="619418440"/>
+                    </a:ext>
+                  </a:extLst>
+                </a:gridCol>
+              </a:tblGrid>
+              <a:tr h="370840">
+                <a:tc>
+                  <a:txBody>
+                    <a:bodyPr/>
+                    <a:lstStyle/>
+                    <a:p>
+                      <a:pPr algn="ctr"/>
+                      <a:endParaRPr lang="en-IN" sz="1100" dirty="0"/>
+                    </a:p>
+                  </a:txBody>
+                  <a:tcPr anchor="ctr"/>
+                </a:tc>
+                <a:tc>
+                  <a:txBody>
+                    <a:bodyPr/>
+                    <a:lstStyle/>
+                    <a:p>
+                      <a:pPr algn="ctr"/>
+                      <a:r>
+                        <a:rPr lang="en-IN" sz="1100" dirty="0"/>
+                        <a:t>Sequence of APIs</a:t>
+                      </a:r>
+                    </a:p>
+                  </a:txBody>
+                  <a:tcPr anchor="ctr"/>
+                </a:tc>
+                <a:extLst>
+                  <a:ext uri="{0D108BD9-81ED-4DB2-BD59-A6C34878D82A}">
+                    <a16:rowId xmlns:a16="http://schemas.microsoft.com/office/drawing/2014/main" val="2958628287"/>
+                  </a:ext>
+                </a:extLst>
+              </a:tr>
+              <a:tr h="370840">
+                <a:tc>
+                  <a:txBody>
+                    <a:bodyPr/>
+                    <a:lstStyle/>
+                    <a:p>
+                      <a:pPr algn="ctr"/>
+                      <a:r>
+                        <a:rPr lang="en-IN" sz="1100" dirty="0"/>
+                        <a:t>Program 1</a:t>
+                      </a:r>
+                    </a:p>
+                  </a:txBody>
+                  <a:tcPr anchor="ctr"/>
+                </a:tc>
+                <a:tc>
+                  <a:txBody>
+                    <a:bodyPr/>
+                    <a:lstStyle/>
+                    <a:p>
+                      <a:pPr algn="ctr"/>
+                      <a:r>
+                        <a:rPr lang="en-IN" sz="1100" dirty="0"/>
+                        <a:t>(API_1, API_3, API_7, API_2)</a:t>
+                      </a:r>
+                    </a:p>
+                  </a:txBody>
+                  <a:tcPr anchor="ctr"/>
+                </a:tc>
+                <a:extLst>
+                  <a:ext uri="{0D108BD9-81ED-4DB2-BD59-A6C34878D82A}">
+                    <a16:rowId xmlns:a16="http://schemas.microsoft.com/office/drawing/2014/main" val="3925131710"/>
+                  </a:ext>
+                </a:extLst>
+              </a:tr>
+              <a:tr h="370840">
+                <a:tc>
+                  <a:txBody>
+                    <a:bodyPr/>
+                    <a:lstStyle/>
+                    <a:p>
+                      <a:pPr algn="ctr"/>
+                      <a:r>
+                        <a:rPr lang="en-IN" sz="1100" dirty="0"/>
+                        <a:t>Program 2</a:t>
+                      </a:r>
+                    </a:p>
+                  </a:txBody>
+                  <a:tcPr anchor="ctr"/>
+                </a:tc>
+                <a:tc>
+                  <a:txBody>
+                    <a:bodyPr/>
+                    <a:lstStyle/>
+                    <a:p>
+                      <a:pPr algn="ctr"/>
+                      <a:r>
+                        <a:rPr lang="en-IN" sz="1100" dirty="0"/>
+                        <a:t>(API_4, API_1, API_3, API_8, API_1, API_2)</a:t>
+                      </a:r>
+                    </a:p>
+                  </a:txBody>
+                  <a:tcPr anchor="ctr"/>
+                </a:tc>
+                <a:extLst>
+                  <a:ext uri="{0D108BD9-81ED-4DB2-BD59-A6C34878D82A}">
+                    <a16:rowId xmlns:a16="http://schemas.microsoft.com/office/drawing/2014/main" val="2623468376"/>
+                  </a:ext>
+                </a:extLst>
+              </a:tr>
+            </a:tbl>
+          </a:graphicData>
+        </a:graphic>
+      </p:graphicFrame>
+      <p:graphicFrame>
+        <p:nvGraphicFramePr>
+          <p:cNvPr id="9" name="Table 8">
+            <a:extLst>
+              <a:ext uri="{FF2B5EF4-FFF2-40B4-BE49-F238E27FC236}">
+                <a16:creationId xmlns:a16="http://schemas.microsoft.com/office/drawing/2014/main" id="{EEB89FBD-99B6-45CB-831E-790E182AC115}"/>
+              </a:ext>
+            </a:extLst>
+          </p:cNvPr>
+          <p:cNvGraphicFramePr>
+            <a:graphicFrameLocks noGrp="1"/>
+          </p:cNvGraphicFramePr>
+          <p:nvPr>
+            <p:extLst>
+              <p:ext uri="{D42A27DB-BD31-4B8C-83A1-F6EECF244321}">
+                <p14:modId xmlns:p14="http://schemas.microsoft.com/office/powerpoint/2010/main" val="3982964840"/>
+              </p:ext>
+            </p:extLst>
+          </p:nvPr>
+        </p:nvGraphicFramePr>
+        <p:xfrm>
+          <a:off x="4334615" y="5062949"/>
+          <a:ext cx="4145597" cy="1483360"/>
+        </p:xfrm>
+        <a:graphic>
+          <a:graphicData uri="http://schemas.openxmlformats.org/drawingml/2006/table">
+            <a:tbl>
+              <a:tblPr firstRow="1" bandRow="1">
+                <a:tableStyleId>{5C22544A-7EE6-4342-B048-85BDC9FD1C3A}</a:tableStyleId>
+              </a:tblPr>
+              <a:tblGrid>
+                <a:gridCol w="1679892">
+                  <a:extLst>
+                    <a:ext uri="{9D8B030D-6E8A-4147-A177-3AD203B41FA5}">
+                      <a16:colId xmlns:a16="http://schemas.microsoft.com/office/drawing/2014/main" val="3459903278"/>
+                    </a:ext>
+                  </a:extLst>
+                </a:gridCol>
+                <a:gridCol w="2465705">
+                  <a:extLst>
+                    <a:ext uri="{9D8B030D-6E8A-4147-A177-3AD203B41FA5}">
+                      <a16:colId xmlns:a16="http://schemas.microsoft.com/office/drawing/2014/main" val="155859054"/>
+                    </a:ext>
+                  </a:extLst>
+                </a:gridCol>
+              </a:tblGrid>
+              <a:tr h="370840">
+                <a:tc>
+                  <a:txBody>
+                    <a:bodyPr/>
+                    <a:lstStyle/>
+                    <a:p>
+                      <a:pPr algn="ctr"/>
+                      <a:endParaRPr lang="en-IN" sz="1100" dirty="0"/>
+                    </a:p>
+                  </a:txBody>
+                  <a:tcPr anchor="ctr"/>
+                </a:tc>
+                <a:tc>
+                  <a:txBody>
+                    <a:bodyPr/>
+                    <a:lstStyle/>
+                    <a:p>
+                      <a:pPr algn="ctr"/>
+                      <a:r>
+                        <a:rPr lang="en-IN" sz="1100" dirty="0"/>
+                        <a:t>API Sequence</a:t>
+                      </a:r>
+                    </a:p>
+                  </a:txBody>
+                  <a:tcPr anchor="ctr"/>
+                </a:tc>
+                <a:extLst>
+                  <a:ext uri="{0D108BD9-81ED-4DB2-BD59-A6C34878D82A}">
+                    <a16:rowId xmlns:a16="http://schemas.microsoft.com/office/drawing/2014/main" val="757139603"/>
+                  </a:ext>
+                </a:extLst>
+              </a:tr>
+              <a:tr h="370840">
+                <a:tc>
+                  <a:txBody>
+                    <a:bodyPr/>
+                    <a:lstStyle/>
+                    <a:p>
+                      <a:pPr algn="ctr"/>
+                      <a:r>
+                        <a:rPr lang="en-IN" sz="1100" dirty="0"/>
+                        <a:t>Original API Sequence</a:t>
+                      </a:r>
+                    </a:p>
+                  </a:txBody>
+                  <a:tcPr anchor="ctr"/>
+                </a:tc>
+                <a:tc>
+                  <a:txBody>
+                    <a:bodyPr/>
+                    <a:lstStyle/>
+                    <a:p>
+                      <a:pPr algn="ctr"/>
+                      <a:r>
+                        <a:rPr lang="en-IN" sz="1100" dirty="0"/>
+                        <a:t>(API_1, API_3, API_7, API_2)</a:t>
+                      </a:r>
+                    </a:p>
+                  </a:txBody>
+                  <a:tcPr anchor="ctr"/>
+                </a:tc>
+                <a:extLst>
+                  <a:ext uri="{0D108BD9-81ED-4DB2-BD59-A6C34878D82A}">
+                    <a16:rowId xmlns:a16="http://schemas.microsoft.com/office/drawing/2014/main" val="2279994703"/>
+                  </a:ext>
+                </a:extLst>
+              </a:tr>
+              <a:tr h="370840">
+                <a:tc>
+                  <a:txBody>
+                    <a:bodyPr/>
+                    <a:lstStyle/>
+                    <a:p>
+                      <a:pPr algn="ctr"/>
+                      <a:r>
+                        <a:rPr lang="en-IN" sz="1100" dirty="0"/>
+                        <a:t>Correctly Perturbated </a:t>
+                      </a:r>
+                    </a:p>
+                  </a:txBody>
+                  <a:tcPr anchor="ctr"/>
+                </a:tc>
+                <a:tc>
+                  <a:txBody>
+                    <a:bodyPr/>
+                    <a:lstStyle/>
+                    <a:p>
+                      <a:pPr marL="0" marR="0" lvl="0" indent="0" algn="ctr" defTabSz="914400" rtl="0" eaLnBrk="1" fontAlgn="auto" latinLnBrk="0" hangingPunct="1">
+                        <a:lnSpc>
+                          <a:spcPct val="100000"/>
+                        </a:lnSpc>
+                        <a:spcBef>
+                          <a:spcPts val="0"/>
+                        </a:spcBef>
+                        <a:spcAft>
+                          <a:spcPts val="0"/>
+                        </a:spcAft>
+                        <a:buClrTx/>
+                        <a:buSzTx/>
+                        <a:buFontTx/>
+                        <a:buNone/>
+                        <a:tabLst/>
+                        <a:defRPr/>
+                      </a:pPr>
+                      <a:r>
+                        <a:rPr lang="en-IN" sz="1100" dirty="0"/>
+                        <a:t>(API_1, API_3, API_7, API_2,</a:t>
+                      </a:r>
+                      <a:r>
+                        <a:rPr lang="en-IN" sz="1100" b="1" dirty="0">
+                          <a:solidFill>
+                            <a:srgbClr val="FF0000"/>
+                          </a:solidFill>
+                        </a:rPr>
+                        <a:t> API_8</a:t>
+                      </a:r>
+                      <a:r>
+                        <a:rPr lang="en-IN" sz="1100" dirty="0"/>
+                        <a:t>)</a:t>
+                      </a:r>
+                    </a:p>
+                  </a:txBody>
+                  <a:tcPr anchor="ctr"/>
+                </a:tc>
+                <a:extLst>
+                  <a:ext uri="{0D108BD9-81ED-4DB2-BD59-A6C34878D82A}">
+                    <a16:rowId xmlns:a16="http://schemas.microsoft.com/office/drawing/2014/main" val="362804822"/>
+                  </a:ext>
+                </a:extLst>
+              </a:tr>
+              <a:tr h="370840">
+                <a:tc>
+                  <a:txBody>
+                    <a:bodyPr/>
+                    <a:lstStyle/>
+                    <a:p>
+                      <a:pPr algn="ctr"/>
+                      <a:r>
+                        <a:rPr lang="en-IN" sz="1100" dirty="0"/>
+                        <a:t>Wrongly Perturbated</a:t>
+                      </a:r>
+                    </a:p>
+                  </a:txBody>
+                  <a:tcPr anchor="ctr"/>
+                </a:tc>
+                <a:tc>
+                  <a:txBody>
+                    <a:bodyPr/>
+                    <a:lstStyle/>
+                    <a:p>
+                      <a:pPr marL="0" marR="0" lvl="0" indent="0" algn="ctr" defTabSz="914400" rtl="0" eaLnBrk="1" fontAlgn="auto" latinLnBrk="0" hangingPunct="1">
+                        <a:lnSpc>
+                          <a:spcPct val="100000"/>
+                        </a:lnSpc>
+                        <a:spcBef>
+                          <a:spcPts val="0"/>
+                        </a:spcBef>
+                        <a:spcAft>
+                          <a:spcPts val="0"/>
+                        </a:spcAft>
+                        <a:buClrTx/>
+                        <a:buSzTx/>
+                        <a:buFontTx/>
+                        <a:buNone/>
+                        <a:tabLst/>
+                        <a:defRPr/>
+                      </a:pPr>
+                      <a:r>
+                        <a:rPr lang="en-IN" sz="1100" dirty="0"/>
+                        <a:t>(API_1, API_3, API_7)</a:t>
+                      </a:r>
+                    </a:p>
+                  </a:txBody>
+                  <a:tcPr anchor="ctr"/>
+                </a:tc>
+                <a:extLst>
+                  <a:ext uri="{0D108BD9-81ED-4DB2-BD59-A6C34878D82A}">
+                    <a16:rowId xmlns:a16="http://schemas.microsoft.com/office/drawing/2014/main" val="644314247"/>
+                  </a:ext>
+                </a:extLst>
+              </a:tr>
+            </a:tbl>
+          </a:graphicData>
+        </a:graphic>
+      </p:graphicFrame>
+      <p:sp>
+        <p:nvSpPr>
+          <p:cNvPr id="10" name="Slide Number Placeholder 9">
+            <a:extLst>
+              <a:ext uri="{FF2B5EF4-FFF2-40B4-BE49-F238E27FC236}">
+                <a16:creationId xmlns:a16="http://schemas.microsoft.com/office/drawing/2014/main" id="{4460E370-4461-4AC4-9F1D-12287D09CFA4}"/>
+              </a:ext>
+            </a:extLst>
+          </p:cNvPr>
+          <p:cNvSpPr>
+            <a:spLocks noGrp="1"/>
+          </p:cNvSpPr>
+          <p:nvPr>
+            <p:ph type="sldNum" sz="quarter" idx="12"/>
+          </p:nvPr>
+        </p:nvSpPr>
+        <p:spPr/>
+        <p:txBody>
+          <a:bodyPr/>
+          <a:lstStyle/>
+          <a:p>
+            <a:fld id="{82BC92B1-C9EA-4D86-A246-22CEB90EE2A6}" type="slidenum">
+              <a:rPr lang="en-IN" smtClean="0"/>
+              <a:t>8</a:t>
+            </a:fld>
+            <a:endParaRPr lang="en-IN"/>
+          </a:p>
+        </p:txBody>
+      </p:sp>
+      <p:sp>
+        <p:nvSpPr>
+          <p:cNvPr id="11" name="Date Placeholder 10">
+            <a:extLst>
+              <a:ext uri="{FF2B5EF4-FFF2-40B4-BE49-F238E27FC236}">
+                <a16:creationId xmlns:a16="http://schemas.microsoft.com/office/drawing/2014/main" id="{0D281BFE-389E-4C55-8451-A03C315D1217}"/>
+              </a:ext>
+            </a:extLst>
+          </p:cNvPr>
+          <p:cNvSpPr>
+            <a:spLocks noGrp="1"/>
+          </p:cNvSpPr>
+          <p:nvPr>
+            <p:ph type="dt" sz="half" idx="10"/>
+          </p:nvPr>
+        </p:nvSpPr>
+        <p:spPr/>
+        <p:txBody>
+          <a:bodyPr/>
+          <a:lstStyle/>
+          <a:p>
+            <a:fld id="{7D04CE3A-7216-43D3-905D-8555A835A83C}" type="datetime1">
+              <a:rPr lang="en-IN" smtClean="0"/>
+              <a:t>11-10-2017</a:t>
+            </a:fld>
+            <a:endParaRPr lang="en-IN"/>
+          </a:p>
+        </p:txBody>
+      </p:sp>
+    </p:spTree>
+    <p:extLst>
+      <p:ext uri="{BB962C8B-B14F-4D97-AF65-F5344CB8AC3E}">
+        <p14:creationId xmlns:p14="http://schemas.microsoft.com/office/powerpoint/2010/main" val="2394152644"/>
+      </p:ext>
+    </p:extLst>
+  </p:cSld>
+  <p:clrMapOvr>
+    <a:masterClrMapping/>
+  </p:clrMapOvr>
+  <p:timing>
+    <p:tnLst>
+      <p:par>
+        <p:cTn id="1" dur="indefinite" restart="never" nodeType="tmRoot">
+          <p:childTnLst>
+            <p:seq concurrent="1" nextAc="seek">
+              <p:cTn id="2" dur="indefinite" nodeType="mainSeq">
+                <p:childTnLst>
+                  <p:par>
+                    <p:cTn id="3" fill="hold">
+                      <p:stCondLst>
+                        <p:cond delay="indefinite"/>
+                      </p:stCondLst>
+                      <p:childTnLst>
+                        <p:par>
+                          <p:cTn id="4" fill="hold">
+                            <p:stCondLst>
+                              <p:cond delay="0"/>
+                            </p:stCondLst>
+                            <p:childTnLst>
+                              <p:par>
+                                <p:cTn id="5" presetID="1" presetClass="entr" presetSubtype="0" fill="hold" grpId="0" nodeType="clickEffect">
+                                  <p:stCondLst>
+                                    <p:cond delay="0"/>
+                                  </p:stCondLst>
+                                  <p:childTnLst>
+                                    <p:set>
+                                      <p:cBhvr>
+                                        <p:cTn id="6" dur="1" fill="hold">
+                                          <p:stCondLst>
+                                            <p:cond delay="0"/>
+                                          </p:stCondLst>
+                                        </p:cTn>
+                                        <p:tgtEl>
+                                          <p:spTgt spid="3">
+                                            <p:txEl>
+                                              <p:pRg st="0" end="0"/>
+                                            </p:txEl>
+                                          </p:spTgt>
+                                        </p:tgtEl>
+                                        <p:attrNameLst>
+                                          <p:attrName>style.visibility</p:attrName>
+                                        </p:attrNameLst>
+                                      </p:cBhvr>
+                                      <p:to>
+                                        <p:strVal val="visible"/>
+                                      </p:to>
+                                    </p:set>
+                                  </p:childTnLst>
+                                </p:cTn>
+                              </p:par>
+                              <p:par>
+                                <p:cTn id="7" presetID="1" presetClass="entr" presetSubtype="0" fill="hold" grpId="0" nodeType="withEffect">
+                                  <p:stCondLst>
+                                    <p:cond delay="0"/>
+                                  </p:stCondLst>
+                                  <p:childTnLst>
+                                    <p:set>
+                                      <p:cBhvr>
+                                        <p:cTn id="8" dur="1" fill="hold">
+                                          <p:stCondLst>
+                                            <p:cond delay="0"/>
+                                          </p:stCondLst>
+                                        </p:cTn>
+                                        <p:tgtEl>
+                                          <p:spTgt spid="3">
+                                            <p:txEl>
+                                              <p:pRg st="1" end="1"/>
+                                            </p:txEl>
+                                          </p:spTgt>
+                                        </p:tgtEl>
+                                        <p:attrNameLst>
+                                          <p:attrName>style.visibility</p:attrName>
+                                        </p:attrNameLst>
+                                      </p:cBhvr>
+                                      <p:to>
+                                        <p:strVal val="visible"/>
+                                      </p:to>
+                                    </p:set>
+                                  </p:childTnLst>
+                                </p:cTn>
+                              </p:par>
+                            </p:childTnLst>
+                          </p:cTn>
+                        </p:par>
+                      </p:childTnLst>
+                    </p:cTn>
+                  </p:par>
+                  <p:par>
+                    <p:cTn id="9" fill="hold">
+                      <p:stCondLst>
+                        <p:cond delay="indefinite"/>
+                      </p:stCondLst>
+                      <p:childTnLst>
+                        <p:par>
+                          <p:cTn id="10" fill="hold">
+                            <p:stCondLst>
+                              <p:cond delay="0"/>
+                            </p:stCondLst>
+                            <p:childTnLst>
+                              <p:par>
+                                <p:cTn id="11" presetID="2" presetClass="entr" presetSubtype="4" fill="hold" nodeType="clickEffect">
+                                  <p:stCondLst>
+                                    <p:cond delay="0"/>
+                                  </p:stCondLst>
+                                  <p:childTnLst>
+                                    <p:set>
+                                      <p:cBhvr>
+                                        <p:cTn id="12" dur="1" fill="hold">
+                                          <p:stCondLst>
+                                            <p:cond delay="0"/>
+                                          </p:stCondLst>
+                                        </p:cTn>
+                                        <p:tgtEl>
+                                          <p:spTgt spid="1026"/>
+                                        </p:tgtEl>
+                                        <p:attrNameLst>
+                                          <p:attrName>style.visibility</p:attrName>
+                                        </p:attrNameLst>
+                                      </p:cBhvr>
+                                      <p:to>
+                                        <p:strVal val="visible"/>
+                                      </p:to>
+                                    </p:set>
+                                    <p:anim calcmode="lin" valueType="num">
+                                      <p:cBhvr additive="base">
+                                        <p:cTn id="13" dur="250" fill="hold"/>
+                                        <p:tgtEl>
+                                          <p:spTgt spid="1026"/>
+                                        </p:tgtEl>
+                                        <p:attrNameLst>
+                                          <p:attrName>ppt_x</p:attrName>
+                                        </p:attrNameLst>
+                                      </p:cBhvr>
+                                      <p:tavLst>
+                                        <p:tav tm="0">
+                                          <p:val>
+                                            <p:strVal val="#ppt_x"/>
+                                          </p:val>
+                                        </p:tav>
+                                        <p:tav tm="100000">
+                                          <p:val>
+                                            <p:strVal val="#ppt_x"/>
+                                          </p:val>
+                                        </p:tav>
+                                      </p:tavLst>
+                                    </p:anim>
+                                    <p:anim calcmode="lin" valueType="num">
+                                      <p:cBhvr additive="base">
+                                        <p:cTn id="14" dur="250" fill="hold"/>
+                                        <p:tgtEl>
+                                          <p:spTgt spid="1026"/>
+                                        </p:tgtEl>
+                                        <p:attrNameLst>
+                                          <p:attrName>ppt_y</p:attrName>
+                                        </p:attrNameLst>
+                                      </p:cBhvr>
+                                      <p:tavLst>
+                                        <p:tav tm="0">
+                                          <p:val>
+                                            <p:strVal val="1+#ppt_h/2"/>
+                                          </p:val>
+                                        </p:tav>
+                                        <p:tav tm="100000">
+                                          <p:val>
+                                            <p:strVal val="#ppt_y"/>
+                                          </p:val>
+                                        </p:tav>
+                                      </p:tavLst>
+                                    </p:anim>
+                                  </p:childTnLst>
+                                </p:cTn>
+                              </p:par>
+                            </p:childTnLst>
+                          </p:cTn>
+                        </p:par>
+                      </p:childTnLst>
+                    </p:cTn>
+                  </p:par>
+                  <p:par>
+                    <p:cTn id="15" fill="hold">
+                      <p:stCondLst>
+                        <p:cond delay="indefinite"/>
+                      </p:stCondLst>
+                      <p:childTnLst>
+                        <p:par>
+                          <p:cTn id="16" fill="hold">
+                            <p:stCondLst>
+                              <p:cond delay="0"/>
+                            </p:stCondLst>
+                            <p:childTnLst>
+                              <p:par>
+                                <p:cTn id="17" presetID="1" presetClass="entr" presetSubtype="0" fill="hold" grpId="0" nodeType="clickEffect">
+                                  <p:stCondLst>
+                                    <p:cond delay="0"/>
+                                  </p:stCondLst>
+                                  <p:childTnLst>
+                                    <p:set>
+                                      <p:cBhvr>
+                                        <p:cTn id="18" dur="1" fill="hold">
+                                          <p:stCondLst>
+                                            <p:cond delay="0"/>
+                                          </p:stCondLst>
+                                        </p:cTn>
+                                        <p:tgtEl>
+                                          <p:spTgt spid="3">
+                                            <p:txEl>
+                                              <p:pRg st="2" end="2"/>
+                                            </p:txEl>
+                                          </p:spTgt>
+                                        </p:tgtEl>
+                                        <p:attrNameLst>
+                                          <p:attrName>style.visibility</p:attrName>
+                                        </p:attrNameLst>
+                                      </p:cBhvr>
+                                      <p:to>
+                                        <p:strVal val="visible"/>
+                                      </p:to>
+                                    </p:set>
+                                  </p:childTnLst>
+                                </p:cTn>
+                              </p:par>
+                            </p:childTnLst>
+                          </p:cTn>
+                        </p:par>
+                      </p:childTnLst>
+                    </p:cTn>
+                  </p:par>
+                  <p:par>
+                    <p:cTn id="19" fill="hold">
+                      <p:stCondLst>
+                        <p:cond delay="indefinite"/>
+                      </p:stCondLst>
+                      <p:childTnLst>
+                        <p:par>
+                          <p:cTn id="20" fill="hold">
+                            <p:stCondLst>
+                              <p:cond delay="0"/>
+                            </p:stCondLst>
+                            <p:childTnLst>
+                              <p:par>
+                                <p:cTn id="21" presetID="2" presetClass="entr" presetSubtype="4" fill="hold" nodeType="clickEffect">
+                                  <p:stCondLst>
+                                    <p:cond delay="0"/>
+                                  </p:stCondLst>
+                                  <p:childTnLst>
+                                    <p:set>
+                                      <p:cBhvr>
+                                        <p:cTn id="22" dur="1" fill="hold">
+                                          <p:stCondLst>
+                                            <p:cond delay="0"/>
+                                          </p:stCondLst>
+                                        </p:cTn>
+                                        <p:tgtEl>
+                                          <p:spTgt spid="7"/>
+                                        </p:tgtEl>
+                                        <p:attrNameLst>
+                                          <p:attrName>style.visibility</p:attrName>
+                                        </p:attrNameLst>
+                                      </p:cBhvr>
+                                      <p:to>
+                                        <p:strVal val="visible"/>
+                                      </p:to>
+                                    </p:set>
+                                    <p:anim calcmode="lin" valueType="num">
+                                      <p:cBhvr additive="base">
+                                        <p:cTn id="23" dur="250" fill="hold"/>
+                                        <p:tgtEl>
+                                          <p:spTgt spid="7"/>
+                                        </p:tgtEl>
+                                        <p:attrNameLst>
+                                          <p:attrName>ppt_x</p:attrName>
+                                        </p:attrNameLst>
+                                      </p:cBhvr>
+                                      <p:tavLst>
+                                        <p:tav tm="0">
+                                          <p:val>
+                                            <p:strVal val="#ppt_x"/>
+                                          </p:val>
+                                        </p:tav>
+                                        <p:tav tm="100000">
+                                          <p:val>
+                                            <p:strVal val="#ppt_x"/>
+                                          </p:val>
+                                        </p:tav>
+                                      </p:tavLst>
+                                    </p:anim>
+                                    <p:anim calcmode="lin" valueType="num">
+                                      <p:cBhvr additive="base">
+                                        <p:cTn id="24" dur="250" fill="hold"/>
+                                        <p:tgtEl>
+                                          <p:spTgt spid="7"/>
+                                        </p:tgtEl>
+                                        <p:attrNameLst>
+                                          <p:attrName>ppt_y</p:attrName>
+                                        </p:attrNameLst>
+                                      </p:cBhvr>
+                                      <p:tavLst>
+                                        <p:tav tm="0">
+                                          <p:val>
+                                            <p:strVal val="1+#ppt_h/2"/>
+                                          </p:val>
+                                        </p:tav>
+                                        <p:tav tm="100000">
+                                          <p:val>
+                                            <p:strVal val="#ppt_y"/>
+                                          </p:val>
+                                        </p:tav>
+                                      </p:tavLst>
+                                    </p:anim>
+                                  </p:childTnLst>
+                                </p:cTn>
+                              </p:par>
+                            </p:childTnLst>
+                          </p:cTn>
+                        </p:par>
+                      </p:childTnLst>
+                    </p:cTn>
+                  </p:par>
+                  <p:par>
+                    <p:cTn id="25" fill="hold">
+                      <p:stCondLst>
+                        <p:cond delay="indefinite"/>
+                      </p:stCondLst>
+                      <p:childTnLst>
+                        <p:par>
+                          <p:cTn id="26" fill="hold">
+                            <p:stCondLst>
+                              <p:cond delay="0"/>
+                            </p:stCondLst>
+                            <p:childTnLst>
+                              <p:par>
+                                <p:cTn id="27" presetID="1" presetClass="exit" presetSubtype="0" fill="hold" nodeType="clickEffect">
+                                  <p:stCondLst>
+                                    <p:cond delay="0"/>
+                                  </p:stCondLst>
+                                  <p:childTnLst>
+                                    <p:set>
+                                      <p:cBhvr>
+                                        <p:cTn id="28" dur="1" fill="hold">
+                                          <p:stCondLst>
+                                            <p:cond delay="0"/>
+                                          </p:stCondLst>
+                                        </p:cTn>
+                                        <p:tgtEl>
+                                          <p:spTgt spid="1026"/>
+                                        </p:tgtEl>
+                                        <p:attrNameLst>
+                                          <p:attrName>style.visibility</p:attrName>
+                                        </p:attrNameLst>
+                                      </p:cBhvr>
+                                      <p:to>
+                                        <p:strVal val="hidden"/>
+                                      </p:to>
+                                    </p:set>
+                                  </p:childTnLst>
+                                </p:cTn>
+                              </p:par>
+                              <p:par>
+                                <p:cTn id="29" presetID="1" presetClass="exit" presetSubtype="0" fill="hold" nodeType="withEffect">
+                                  <p:stCondLst>
+                                    <p:cond delay="0"/>
+                                  </p:stCondLst>
+                                  <p:childTnLst>
+                                    <p:set>
+                                      <p:cBhvr>
+                                        <p:cTn id="30" dur="1" fill="hold">
+                                          <p:stCondLst>
+                                            <p:cond delay="0"/>
+                                          </p:stCondLst>
+                                        </p:cTn>
+                                        <p:tgtEl>
+                                          <p:spTgt spid="7"/>
+                                        </p:tgtEl>
+                                        <p:attrNameLst>
+                                          <p:attrName>style.visibility</p:attrName>
+                                        </p:attrNameLst>
+                                      </p:cBhvr>
+                                      <p:to>
+                                        <p:strVal val="hidden"/>
+                                      </p:to>
+                                    </p:set>
+                                  </p:childTnLst>
+                                </p:cTn>
+                              </p:par>
+                              <p:par>
+                                <p:cTn id="31" presetID="1" presetClass="entr" presetSubtype="0" fill="hold" grpId="0" nodeType="withEffect">
+                                  <p:stCondLst>
+                                    <p:cond delay="0"/>
+                                  </p:stCondLst>
+                                  <p:childTnLst>
+                                    <p:set>
+                                      <p:cBhvr>
+                                        <p:cTn id="32" dur="1" fill="hold">
+                                          <p:stCondLst>
+                                            <p:cond delay="0"/>
+                                          </p:stCondLst>
+                                        </p:cTn>
+                                        <p:tgtEl>
+                                          <p:spTgt spid="3">
+                                            <p:txEl>
+                                              <p:pRg st="3" end="3"/>
+                                            </p:txEl>
+                                          </p:spTgt>
+                                        </p:tgtEl>
+                                        <p:attrNameLst>
+                                          <p:attrName>style.visibility</p:attrName>
+                                        </p:attrNameLst>
+                                      </p:cBhvr>
+                                      <p:to>
+                                        <p:strVal val="visible"/>
+                                      </p:to>
+                                    </p:set>
+                                  </p:childTnLst>
+                                </p:cTn>
+                              </p:par>
+                            </p:childTnLst>
+                          </p:cTn>
+                        </p:par>
+                      </p:childTnLst>
+                    </p:cTn>
+                  </p:par>
+                  <p:par>
+                    <p:cTn id="33" fill="hold">
+                      <p:stCondLst>
+                        <p:cond delay="indefinite"/>
+                      </p:stCondLst>
+                      <p:childTnLst>
+                        <p:par>
+                          <p:cTn id="34" fill="hold">
+                            <p:stCondLst>
+                              <p:cond delay="0"/>
+                            </p:stCondLst>
+                            <p:childTnLst>
+                              <p:par>
+                                <p:cTn id="35" presetID="2" presetClass="entr" presetSubtype="4" fill="hold" nodeType="clickEffect">
+                                  <p:stCondLst>
+                                    <p:cond delay="0"/>
+                                  </p:stCondLst>
+                                  <p:childTnLst>
+                                    <p:set>
+                                      <p:cBhvr>
+                                        <p:cTn id="36" dur="1" fill="hold">
+                                          <p:stCondLst>
+                                            <p:cond delay="0"/>
+                                          </p:stCondLst>
+                                        </p:cTn>
+                                        <p:tgtEl>
+                                          <p:spTgt spid="9"/>
+                                        </p:tgtEl>
+                                        <p:attrNameLst>
+                                          <p:attrName>style.visibility</p:attrName>
+                                        </p:attrNameLst>
+                                      </p:cBhvr>
+                                      <p:to>
+                                        <p:strVal val="visible"/>
+                                      </p:to>
+                                    </p:set>
+                                    <p:anim calcmode="lin" valueType="num">
+                                      <p:cBhvr additive="base">
+                                        <p:cTn id="37" dur="250" fill="hold"/>
+                                        <p:tgtEl>
+                                          <p:spTgt spid="9"/>
+                                        </p:tgtEl>
+                                        <p:attrNameLst>
+                                          <p:attrName>ppt_x</p:attrName>
+                                        </p:attrNameLst>
+                                      </p:cBhvr>
+                                      <p:tavLst>
+                                        <p:tav tm="0">
+                                          <p:val>
+                                            <p:strVal val="#ppt_x"/>
+                                          </p:val>
+                                        </p:tav>
+                                        <p:tav tm="100000">
+                                          <p:val>
+                                            <p:strVal val="#ppt_x"/>
+                                          </p:val>
+                                        </p:tav>
+                                      </p:tavLst>
+                                    </p:anim>
+                                    <p:anim calcmode="lin" valueType="num">
+                                      <p:cBhvr additive="base">
+                                        <p:cTn id="38" dur="250" fill="hold"/>
+                                        <p:tgtEl>
+                                          <p:spTgt spid="9"/>
+                                        </p:tgtEl>
+                                        <p:attrNameLst>
+                                          <p:attrName>ppt_y</p:attrName>
+                                        </p:attrNameLst>
+                                      </p:cBhvr>
+                                      <p:tavLst>
+                                        <p:tav tm="0">
+                                          <p:val>
+                                            <p:strVal val="1+#ppt_h/2"/>
+                                          </p:val>
+                                        </p:tav>
+                                        <p:tav tm="100000">
+                                          <p:val>
+                                            <p:strVal val="#ppt_y"/>
+                                          </p:val>
+                                        </p:tav>
+                                      </p:tavLst>
+                                    </p:anim>
+                                  </p:childTnLst>
+                                </p:cTn>
+                              </p:par>
+                            </p:childTnLst>
+                          </p:cTn>
+                        </p:par>
+                      </p:childTnLst>
+                    </p:cTn>
+                  </p:par>
+                </p:childTnLst>
+              </p:cTn>
+              <p:prevCondLst>
+                <p:cond evt="onPrev" delay="0">
+                  <p:tgtEl>
+                    <p:sldTgt/>
+                  </p:tgtEl>
+                </p:cond>
+              </p:prevCondLst>
+              <p:nextCondLst>
+                <p:cond evt="onNext" delay="0">
+                  <p:tgtEl>
+                    <p:sldTgt/>
+                  </p:tgtEl>
+                </p:cond>
+              </p:nextCondLst>
+            </p:seq>
+          </p:childTnLst>
+        </p:cTn>
+      </p:par>
+    </p:tnLst>
+    <p:bldLst>
+      <p:bldP spid="3" grpId="0" uiExpand="1" build="p"/>
+    </p:bldLst>
+  </p:timing>
+</p:sld>
+</file>
+
+<file path=ppt/slides/slide9.xml><?xml version="1.0" encoding="utf-8"?>
+<p:sld xmlns:a="http://schemas.openxmlformats.org/drawingml/2006/main" xmlns:r="http://schemas.openxmlformats.org/officeDocument/2006/relationships" xmlns:p="http://schemas.openxmlformats.org/presentationml/2006/main">
+  <p:cSld>
+    <p:spTree>
+      <p:nvGrpSpPr>
+        <p:cNvPr id="1" name=""/>
+        <p:cNvGrpSpPr/>
+        <p:nvPr/>
+      </p:nvGrpSpPr>
+      <p:grpSpPr>
+        <a:xfrm>
+          <a:off x="0" y="0"/>
+          <a:ext cx="0" cy="0"/>
+          <a:chOff x="0" y="0"/>
+          <a:chExt cx="0" cy="0"/>
+        </a:xfrm>
+      </p:grpSpPr>
+      <p:sp>
+        <p:nvSpPr>
+          <p:cNvPr id="2" name="Title 1">
+            <a:extLst>
+              <a:ext uri="{FF2B5EF4-FFF2-40B4-BE49-F238E27FC236}">
+                <a16:creationId xmlns:a16="http://schemas.microsoft.com/office/drawing/2014/main" id="{79EBC8E0-548A-414F-AAB9-51C713C34F27}"/>
+              </a:ext>
+            </a:extLst>
+          </p:cNvPr>
+          <p:cNvSpPr>
+            <a:spLocks noGrp="1"/>
+          </p:cNvSpPr>
+          <p:nvPr>
+            <p:ph type="title"/>
+          </p:nvPr>
+        </p:nvSpPr>
+        <p:spPr/>
+        <p:txBody>
+          <a:bodyPr/>
+          <a:lstStyle/>
+          <a:p>
+            <a:r>
+              <a:rPr lang="en-IN" dirty="0"/>
+              <a:t>Main Attack Idea</a:t>
+            </a:r>
+          </a:p>
+        </p:txBody>
+      </p:sp>
+      <p:sp>
+        <p:nvSpPr>
+          <p:cNvPr id="3" name="Content Placeholder 2">
+            <a:extLst>
+              <a:ext uri="{FF2B5EF4-FFF2-40B4-BE49-F238E27FC236}">
+                <a16:creationId xmlns:a16="http://schemas.microsoft.com/office/drawing/2014/main" id="{BF05E424-3502-419D-A664-F3A24FDB87BC}"/>
+              </a:ext>
+            </a:extLst>
+          </p:cNvPr>
+          <p:cNvSpPr>
+            <a:spLocks noGrp="1"/>
+          </p:cNvSpPr>
+          <p:nvPr>
+            <p:ph idx="1"/>
+          </p:nvPr>
+        </p:nvSpPr>
+        <p:spPr/>
+        <p:txBody>
+          <a:bodyPr>
+            <a:normAutofit/>
+          </a:bodyPr>
+          <a:lstStyle/>
+          <a:p>
+            <a:pPr algn="just"/>
+            <a:r>
+              <a:rPr lang="en-IN" dirty="0"/>
+              <a:t>Threat Model</a:t>
+            </a:r>
+            <a:endParaRPr lang="en-GB" dirty="0"/>
+          </a:p>
+          <a:p>
+            <a:pPr lvl="1" algn="just"/>
+            <a:r>
+              <a:rPr lang="en-GB" dirty="0"/>
+              <a:t>Uses a generative RNN based approach to generate irreverent APIs and insert them into the original API sequences.</a:t>
+            </a:r>
+          </a:p>
+          <a:p>
+            <a:pPr lvl="1" algn="just"/>
+            <a:r>
+              <a:rPr lang="en-GB" dirty="0"/>
+              <a:t>A substitute RNN is trained to fit the victim RNN.</a:t>
+            </a:r>
+          </a:p>
+          <a:p>
+            <a:pPr lvl="1" algn="just"/>
+            <a:r>
+              <a:rPr lang="en-GB" dirty="0"/>
+              <a:t>Gumbel-</a:t>
+            </a:r>
+            <a:r>
+              <a:rPr lang="en-GB" dirty="0" err="1"/>
+              <a:t>Softmax</a:t>
+            </a:r>
+            <a:r>
+              <a:rPr lang="en-GB" dirty="0"/>
+              <a:t> is used to smooth the API symbols and deliver gradient information between the generative RNN and the substitute RNN.</a:t>
+            </a:r>
+            <a:endParaRPr lang="en-IN" dirty="0"/>
+          </a:p>
+        </p:txBody>
+      </p:sp>
+      <p:sp>
+        <p:nvSpPr>
+          <p:cNvPr id="4" name="Slide Number Placeholder 3">
+            <a:extLst>
+              <a:ext uri="{FF2B5EF4-FFF2-40B4-BE49-F238E27FC236}">
+                <a16:creationId xmlns:a16="http://schemas.microsoft.com/office/drawing/2014/main" id="{38A7CD3C-BE9C-4CB1-83C7-0A7F6DB18029}"/>
+              </a:ext>
+            </a:extLst>
+          </p:cNvPr>
+          <p:cNvSpPr>
+            <a:spLocks noGrp="1"/>
+          </p:cNvSpPr>
+          <p:nvPr>
+            <p:ph type="sldNum" sz="quarter" idx="12"/>
+          </p:nvPr>
+        </p:nvSpPr>
+        <p:spPr/>
+        <p:txBody>
+          <a:bodyPr/>
+          <a:lstStyle/>
+          <a:p>
+            <a:fld id="{82BC92B1-C9EA-4D86-A246-22CEB90EE2A6}" type="slidenum">
+              <a:rPr lang="en-IN" smtClean="0"/>
+              <a:t>9</a:t>
+            </a:fld>
+            <a:endParaRPr lang="en-IN"/>
+          </a:p>
+        </p:txBody>
+      </p:sp>
+      <p:sp>
+        <p:nvSpPr>
+          <p:cNvPr id="5" name="Date Placeholder 4">
+            <a:extLst>
+              <a:ext uri="{FF2B5EF4-FFF2-40B4-BE49-F238E27FC236}">
+                <a16:creationId xmlns:a16="http://schemas.microsoft.com/office/drawing/2014/main" id="{0FBDB21C-5A04-4DD3-8B72-73CC37E33CA9}"/>
+              </a:ext>
+            </a:extLst>
+          </p:cNvPr>
+          <p:cNvSpPr>
+            <a:spLocks noGrp="1"/>
+          </p:cNvSpPr>
+          <p:nvPr>
+            <p:ph type="dt" sz="half" idx="10"/>
+          </p:nvPr>
+        </p:nvSpPr>
+        <p:spPr/>
+        <p:txBody>
+          <a:bodyPr/>
+          <a:lstStyle/>
+          <a:p>
+            <a:fld id="{E7374EA0-DAF7-4C60-8CEF-4C3B065629DE}" type="datetime1">
+              <a:rPr lang="en-IN" smtClean="0"/>
+              <a:t>11-10-2017</a:t>
+            </a:fld>
+            <a:endParaRPr lang="en-IN"/>
+          </a:p>
+        </p:txBody>
+      </p:sp>
+    </p:spTree>
+    <p:extLst>
+      <p:ext uri="{BB962C8B-B14F-4D97-AF65-F5344CB8AC3E}">
+        <p14:creationId xmlns:p14="http://schemas.microsoft.com/office/powerpoint/2010/main" val="2439230405"/>
+      </p:ext>
+    </p:extLst>
+  </p:cSld>
+  <p:clrMapOvr>
+    <a:masterClrMapping/>
+  </p:clrMapOvr>
+  <p:timing>
+    <p:tnLst>
+      <p:par>
+        <p:cTn id="1" dur="indefinite" restart="never" nodeType="tmRoot">
+          <p:childTnLst>
+            <p:seq concurrent="1" nextAc="seek">
+              <p:cTn id="2" dur="indefinite" nodeType="mainSeq">
+                <p:childTnLst>
+                  <p:par>
+                    <p:cTn id="3" fill="hold">
+                      <p:stCondLst>
+                        <p:cond delay="indefinite"/>
+                      </p:stCondLst>
+                      <p:childTnLst>
+                        <p:par>
+                          <p:cTn id="4" fill="hold">
+                            <p:stCondLst>
+                              <p:cond delay="0"/>
+                            </p:stCondLst>
+                            <p:childTnLst>
+                              <p:par>
+                                <p:cTn id="5" presetID="1" presetClass="entr" presetSubtype="0" fill="hold" grpId="0" nodeType="clickEffect">
+                                  <p:stCondLst>
+                                    <p:cond delay="0"/>
+                                  </p:stCondLst>
+                                  <p:childTnLst>
+                                    <p:set>
+                                      <p:cBhvr>
+                                        <p:cTn id="6" dur="1" fill="hold">
+                                          <p:stCondLst>
+                                            <p:cond delay="0"/>
+                                          </p:stCondLst>
+                                        </p:cTn>
+                                        <p:tgtEl>
+                                          <p:spTgt spid="3">
+                                            <p:txEl>
+                                              <p:pRg st="0" end="0"/>
+                                            </p:txEl>
+                                          </p:spTgt>
+                                        </p:tgtEl>
+                                        <p:attrNameLst>
+                                          <p:attrName>style.visibility</p:attrName>
+                                        </p:attrNameLst>
+                                      </p:cBhvr>
+                                      <p:to>
+                                        <p:strVal val="visible"/>
+                                      </p:to>
+                                    </p:set>
+                                  </p:childTnLst>
+                                </p:cTn>
+                              </p:par>
+                              <p:par>
+                                <p:cTn id="7" presetID="1" presetClass="entr" presetSubtype="0" fill="hold" grpId="0" nodeType="withEffect">
+                                  <p:stCondLst>
+                                    <p:cond delay="0"/>
+                                  </p:stCondLst>
+                                  <p:childTnLst>
+                                    <p:set>
+                                      <p:cBhvr>
+                                        <p:cTn id="8" dur="1" fill="hold">
+                                          <p:stCondLst>
+                                            <p:cond delay="0"/>
+                                          </p:stCondLst>
+                                        </p:cTn>
+                                        <p:tgtEl>
+                                          <p:spTgt spid="3">
+                                            <p:txEl>
+                                              <p:pRg st="1" end="1"/>
+                                            </p:txEl>
+                                          </p:spTgt>
+                                        </p:tgtEl>
+                                        <p:attrNameLst>
+                                          <p:attrName>style.visibility</p:attrName>
+                                        </p:attrNameLst>
+                                      </p:cBhvr>
+                                      <p:to>
+                                        <p:strVal val="visible"/>
+                                      </p:to>
+                                    </p:set>
+                                  </p:childTnLst>
+                                </p:cTn>
+                              </p:par>
+                            </p:childTnLst>
+                          </p:cTn>
+                        </p:par>
+                      </p:childTnLst>
+                    </p:cTn>
+                  </p:par>
+                  <p:par>
+                    <p:cTn id="9" fill="hold">
+                      <p:stCondLst>
+                        <p:cond delay="indefinite"/>
+                      </p:stCondLst>
+                      <p:childTnLst>
+                        <p:par>
+                          <p:cTn id="10" fill="hold">
+                            <p:stCondLst>
+                              <p:cond delay="0"/>
+                            </p:stCondLst>
+                            <p:childTnLst>
+                              <p:par>
+                                <p:cTn id="11" presetID="1" presetClass="entr" presetSubtype="0" fill="hold" grpId="0" nodeType="clickEffect">
+                                  <p:stCondLst>
+                                    <p:cond delay="0"/>
+                                  </p:stCondLst>
+                                  <p:childTnLst>
+                                    <p:set>
+                                      <p:cBhvr>
+                                        <p:cTn id="12" dur="1" fill="hold">
+                                          <p:stCondLst>
+                                            <p:cond delay="0"/>
+                                          </p:stCondLst>
+                                        </p:cTn>
+                                        <p:tgtEl>
+                                          <p:spTgt spid="3">
+                                            <p:txEl>
+                                              <p:pRg st="2" end="2"/>
+                                            </p:txEl>
+                                          </p:spTgt>
+                                        </p:tgtEl>
+                                        <p:attrNameLst>
+                                          <p:attrName>style.visibility</p:attrName>
+                                        </p:attrNameLst>
+                                      </p:cBhvr>
+                                      <p:to>
+                                        <p:strVal val="visible"/>
+                                      </p:to>
+                                    </p:set>
+                                  </p:childTnLst>
+                                </p:cTn>
+                              </p:par>
+                            </p:childTnLst>
+                          </p:cTn>
+                        </p:par>
+                      </p:childTnLst>
+                    </p:cTn>
+                  </p:par>
+                  <p:par>
+                    <p:cTn id="13" fill="hold">
+                      <p:stCondLst>
+                        <p:cond delay="indefinite"/>
+                      </p:stCondLst>
+                      <p:childTnLst>
+                        <p:par>
+                          <p:cTn id="14" fill="hold">
+                            <p:stCondLst>
+                              <p:cond delay="0"/>
+                            </p:stCondLst>
+                            <p:childTnLst>
+                              <p:par>
+                                <p:cTn id="15" presetID="1" presetClass="entr" presetSubtype="0" fill="hold" grpId="0" nodeType="clickEffect">
+                                  <p:stCondLst>
+                                    <p:cond delay="0"/>
+                                  </p:stCondLst>
+                                  <p:childTnLst>
+                                    <p:set>
+                                      <p:cBhvr>
+                                        <p:cTn id="16" dur="1" fill="hold">
+                                          <p:stCondLst>
+                                            <p:cond delay="0"/>
+                                          </p:stCondLst>
+                                        </p:cTn>
+                                        <p:tgtEl>
+                                          <p:spTgt spid="3">
+                                            <p:txEl>
+                                              <p:pRg st="3" end="3"/>
                                             </p:txEl>
                                           </p:spTgt>
                                         </p:tgtEl>

</xml_diff>